<commit_message>
correcao do desenho da tela ganhou/perdeu
</commit_message>
<xml_diff>
--- a/phaser/no-boo/assets/telas/outros/telas.pptx
+++ b/phaser/no-boo/assets/telas/outros/telas.pptx
@@ -9,7 +9,7 @@
     <p:sldId id="267" r:id="rId3"/>
     <p:sldId id="266" r:id="rId4"/>
     <p:sldId id="261" r:id="rId5"/>
-    <p:sldId id="263" r:id="rId6"/>
+    <p:sldId id="268" r:id="rId6"/>
     <p:sldId id="265" r:id="rId7"/>
   </p:sldIdLst>
   <p:sldSz cx="9144000" cy="6858000" type="screen4x3"/>
@@ -4520,7 +4520,7 @@
         </p:blipFill>
         <p:spPr>
           <a:xfrm rot="10800000">
-            <a:off x="5940152" y="3275078"/>
+            <a:off x="5940152" y="3370640"/>
             <a:ext cx="314286" cy="304762"/>
           </a:xfrm>
           <a:prstGeom prst="rect">
@@ -4550,7 +4550,7 @@
         </p:blipFill>
         <p:spPr>
           <a:xfrm>
-            <a:off x="2843808" y="3247782"/>
+            <a:off x="2843808" y="3343344"/>
             <a:ext cx="314286" cy="304762"/>
           </a:xfrm>
           <a:prstGeom prst="rect">
@@ -4568,7 +4568,7 @@
         </p:nvSpPr>
         <p:spPr>
           <a:xfrm>
-            <a:off x="5796136" y="4622072"/>
+            <a:off x="5796136" y="4723080"/>
             <a:ext cx="262800" cy="262800"/>
           </a:xfrm>
           <a:prstGeom prst="heart">
@@ -4618,7 +4618,7 @@
         </p:nvSpPr>
         <p:spPr>
           <a:xfrm>
-            <a:off x="6209375" y="4622072"/>
+            <a:off x="6209375" y="4723080"/>
             <a:ext cx="262800" cy="262800"/>
           </a:xfrm>
           <a:prstGeom prst="heart">
@@ -4668,7 +4668,7 @@
         </p:nvSpPr>
         <p:spPr>
           <a:xfrm>
-            <a:off x="6622615" y="4622072"/>
+            <a:off x="6622615" y="4723080"/>
             <a:ext cx="262800" cy="262800"/>
           </a:xfrm>
           <a:prstGeom prst="heart">
@@ -5479,7 +5479,7 @@
       </p:grpSpPr>
       <p:sp>
         <p:nvSpPr>
-          <p:cNvPr id="7" name="Título 5"/>
+          <p:cNvPr id="6" name="Título 5"/>
           <p:cNvSpPr txBox="1">
             <a:spLocks/>
           </p:cNvSpPr>
@@ -5487,8 +5487,8 @@
         </p:nvSpPr>
         <p:spPr>
           <a:xfrm>
-            <a:off x="457200" y="550545"/>
-            <a:ext cx="8229600" cy="1582311"/>
+            <a:off x="457200" y="5187983"/>
+            <a:ext cx="8229600" cy="1143000"/>
           </a:xfrm>
           <a:prstGeom prst="rect">
             <a:avLst/>
@@ -5596,7 +5596,137 @@
           <a:p>
             <a:pPr algn="ctr"/>
             <a:r>
-              <a:rPr lang="pt-BR" sz="9000" dirty="0" smtClean="0">
+              <a:rPr lang="pt-BR" sz="5000" dirty="0">
+                <a:latin typeface="Grinched" panose="02000000000000000000" pitchFamily="2" charset="0"/>
+              </a:rPr>
+              <a:t>Voce atingiu 5 fantasmas.</a:t>
+            </a:r>
+            <a:endParaRPr lang="pt-BR" sz="5000" dirty="0">
+              <a:latin typeface="Grinched" panose="02000000000000000000" pitchFamily="2" charset="0"/>
+            </a:endParaRPr>
+          </a:p>
+        </p:txBody>
+      </p:sp>
+      <p:sp>
+        <p:nvSpPr>
+          <p:cNvPr id="7" name="Título 5"/>
+          <p:cNvSpPr txBox="1">
+            <a:spLocks/>
+          </p:cNvSpPr>
+          <p:nvPr/>
+        </p:nvSpPr>
+        <p:spPr>
+          <a:xfrm>
+            <a:off x="457200" y="319008"/>
+            <a:ext cx="8229600" cy="1582311"/>
+          </a:xfrm>
+          <a:prstGeom prst="rect">
+            <a:avLst/>
+          </a:prstGeom>
+        </p:spPr>
+        <p:txBody>
+          <a:bodyPr vert="horz" lIns="91440" tIns="45720" rIns="91440" bIns="45720" rtlCol="0" anchor="ctr">
+            <a:normAutofit/>
+          </a:bodyPr>
+          <a:lstStyle>
+            <a:defPPr>
+              <a:defRPr lang="pt-BR"/>
+            </a:defPPr>
+            <a:lvl1pPr marL="0" algn="l" defTabSz="914400" rtl="0" eaLnBrk="1" latinLnBrk="0" hangingPunct="1">
+              <a:defRPr sz="1800" kern="1200">
+                <a:solidFill>
+                  <a:schemeClr val="tx1"/>
+                </a:solidFill>
+                <a:latin typeface="+mn-lt"/>
+                <a:ea typeface="+mn-ea"/>
+                <a:cs typeface="+mn-cs"/>
+              </a:defRPr>
+            </a:lvl1pPr>
+            <a:lvl2pPr marL="457200" algn="l" defTabSz="914400" rtl="0" eaLnBrk="1" latinLnBrk="0" hangingPunct="1">
+              <a:defRPr sz="1800" kern="1200">
+                <a:solidFill>
+                  <a:schemeClr val="tx1"/>
+                </a:solidFill>
+                <a:latin typeface="+mn-lt"/>
+                <a:ea typeface="+mn-ea"/>
+                <a:cs typeface="+mn-cs"/>
+              </a:defRPr>
+            </a:lvl2pPr>
+            <a:lvl3pPr marL="914400" algn="l" defTabSz="914400" rtl="0" eaLnBrk="1" latinLnBrk="0" hangingPunct="1">
+              <a:defRPr sz="1800" kern="1200">
+                <a:solidFill>
+                  <a:schemeClr val="tx1"/>
+                </a:solidFill>
+                <a:latin typeface="+mn-lt"/>
+                <a:ea typeface="+mn-ea"/>
+                <a:cs typeface="+mn-cs"/>
+              </a:defRPr>
+            </a:lvl3pPr>
+            <a:lvl4pPr marL="1371600" algn="l" defTabSz="914400" rtl="0" eaLnBrk="1" latinLnBrk="0" hangingPunct="1">
+              <a:defRPr sz="1800" kern="1200">
+                <a:solidFill>
+                  <a:schemeClr val="tx1"/>
+                </a:solidFill>
+                <a:latin typeface="+mn-lt"/>
+                <a:ea typeface="+mn-ea"/>
+                <a:cs typeface="+mn-cs"/>
+              </a:defRPr>
+            </a:lvl4pPr>
+            <a:lvl5pPr marL="1828800" algn="l" defTabSz="914400" rtl="0" eaLnBrk="1" latinLnBrk="0" hangingPunct="1">
+              <a:defRPr sz="1800" kern="1200">
+                <a:solidFill>
+                  <a:schemeClr val="tx1"/>
+                </a:solidFill>
+                <a:latin typeface="+mn-lt"/>
+                <a:ea typeface="+mn-ea"/>
+                <a:cs typeface="+mn-cs"/>
+              </a:defRPr>
+            </a:lvl5pPr>
+            <a:lvl6pPr marL="2286000" algn="l" defTabSz="914400" rtl="0" eaLnBrk="1" latinLnBrk="0" hangingPunct="1">
+              <a:defRPr sz="1800" kern="1200">
+                <a:solidFill>
+                  <a:schemeClr val="tx1"/>
+                </a:solidFill>
+                <a:latin typeface="+mn-lt"/>
+                <a:ea typeface="+mn-ea"/>
+                <a:cs typeface="+mn-cs"/>
+              </a:defRPr>
+            </a:lvl6pPr>
+            <a:lvl7pPr marL="2743200" algn="l" defTabSz="914400" rtl="0" eaLnBrk="1" latinLnBrk="0" hangingPunct="1">
+              <a:defRPr sz="1800" kern="1200">
+                <a:solidFill>
+                  <a:schemeClr val="tx1"/>
+                </a:solidFill>
+                <a:latin typeface="+mn-lt"/>
+                <a:ea typeface="+mn-ea"/>
+                <a:cs typeface="+mn-cs"/>
+              </a:defRPr>
+            </a:lvl7pPr>
+            <a:lvl8pPr marL="3200400" algn="l" defTabSz="914400" rtl="0" eaLnBrk="1" latinLnBrk="0" hangingPunct="1">
+              <a:defRPr sz="1800" kern="1200">
+                <a:solidFill>
+                  <a:schemeClr val="tx1"/>
+                </a:solidFill>
+                <a:latin typeface="+mn-lt"/>
+                <a:ea typeface="+mn-ea"/>
+                <a:cs typeface="+mn-cs"/>
+              </a:defRPr>
+            </a:lvl8pPr>
+            <a:lvl9pPr marL="3657600" algn="l" defTabSz="914400" rtl="0" eaLnBrk="1" latinLnBrk="0" hangingPunct="1">
+              <a:defRPr sz="1800" kern="1200">
+                <a:solidFill>
+                  <a:schemeClr val="tx1"/>
+                </a:solidFill>
+                <a:latin typeface="+mn-lt"/>
+                <a:ea typeface="+mn-ea"/>
+                <a:cs typeface="+mn-cs"/>
+              </a:defRPr>
+            </a:lvl9pPr>
+          </a:lstStyle>
+          <a:p>
+            <a:pPr algn="ctr"/>
+            <a:r>
+              <a:rPr lang="pt-BR" sz="9000" dirty="0">
                 <a:solidFill>
                   <a:schemeClr val="accent1"/>
                 </a:solidFill>
@@ -5613,9 +5743,46 @@
           </a:p>
         </p:txBody>
       </p:sp>
+      <p:sp>
+        <p:nvSpPr>
+          <p:cNvPr id="11" name="CaixaDeTexto 10"/>
+          <p:cNvSpPr txBox="1"/>
+          <p:nvPr/>
+        </p:nvSpPr>
+        <p:spPr>
+          <a:xfrm rot="19008857">
+            <a:off x="515002" y="614559"/>
+            <a:ext cx="1172188" cy="477054"/>
+          </a:xfrm>
+          <a:prstGeom prst="rect">
+            <a:avLst/>
+          </a:prstGeom>
+          <a:noFill/>
+        </p:spPr>
+        <p:txBody>
+          <a:bodyPr wrap="square" rtlCol="0">
+            <a:spAutoFit/>
+          </a:bodyPr>
+          <a:lstStyle/>
+          <a:p>
+            <a:r>
+              <a:rPr lang="pt-BR" sz="2500" dirty="0" smtClean="0">
+                <a:solidFill>
+                  <a:schemeClr val="bg1">
+                    <a:lumMod val="50000"/>
+                    <a:lumOff val="50000"/>
+                  </a:schemeClr>
+                </a:solidFill>
+                <a:latin typeface="Grinched" panose="02000000000000000000" pitchFamily="2" charset="0"/>
+              </a:rPr>
+              <a:t>NO-BOO</a:t>
+            </a:r>
+          </a:p>
+        </p:txBody>
+      </p:sp>
       <p:pic>
         <p:nvPicPr>
-          <p:cNvPr id="8" name="Imagem 7"/>
+          <p:cNvPr id="16" name="Imagem 15"/>
           <p:cNvPicPr>
             <a:picLocks noChangeAspect="1"/>
           </p:cNvPicPr>
@@ -5635,7 +5802,7 @@
         </p:blipFill>
         <p:spPr>
           <a:xfrm>
-            <a:off x="4678900" y="2907528"/>
+            <a:off x="4678900" y="2722568"/>
             <a:ext cx="325148" cy="325148"/>
           </a:xfrm>
           <a:prstGeom prst="rect">
@@ -5645,7 +5812,7 @@
       </p:pic>
       <p:pic>
         <p:nvPicPr>
-          <p:cNvPr id="9" name="Imagem 8"/>
+          <p:cNvPr id="17" name="Imagem 16"/>
           <p:cNvPicPr>
             <a:picLocks noChangeAspect="1"/>
           </p:cNvPicPr>
@@ -5665,7 +5832,7 @@
         </p:blipFill>
         <p:spPr>
           <a:xfrm>
-            <a:off x="4139952" y="3872666"/>
+            <a:off x="4139952" y="3687706"/>
             <a:ext cx="325148" cy="325148"/>
           </a:xfrm>
           <a:prstGeom prst="rect">
@@ -5675,7 +5842,7 @@
       </p:pic>
       <p:pic>
         <p:nvPicPr>
-          <p:cNvPr id="12" name="Imagem 11"/>
+          <p:cNvPr id="18" name="Imagem 17"/>
           <p:cNvPicPr>
             <a:picLocks noChangeAspect="1"/>
           </p:cNvPicPr>
@@ -5695,7 +5862,7 @@
         </p:blipFill>
         <p:spPr>
           <a:xfrm>
-            <a:off x="3779912" y="3619083"/>
+            <a:off x="3779912" y="3434123"/>
             <a:ext cx="304762" cy="304762"/>
           </a:xfrm>
           <a:prstGeom prst="rect">
@@ -5705,7 +5872,7 @@
       </p:pic>
       <p:pic>
         <p:nvPicPr>
-          <p:cNvPr id="13" name="Imagem 12"/>
+          <p:cNvPr id="21" name="Imagem 20"/>
           <p:cNvPicPr>
             <a:picLocks noChangeAspect="1"/>
           </p:cNvPicPr>
@@ -5725,7 +5892,7 @@
         </p:blipFill>
         <p:spPr>
           <a:xfrm>
-            <a:off x="4246594" y="4352467"/>
+            <a:off x="4246594" y="4167507"/>
             <a:ext cx="304762" cy="304762"/>
           </a:xfrm>
           <a:prstGeom prst="rect">
@@ -5735,7 +5902,7 @@
       </p:pic>
       <p:pic>
         <p:nvPicPr>
-          <p:cNvPr id="17" name="Imagem 16"/>
+          <p:cNvPr id="22" name="Imagem 21"/>
           <p:cNvPicPr>
             <a:picLocks noChangeAspect="1"/>
           </p:cNvPicPr>
@@ -5755,7 +5922,7 @@
         </p:blipFill>
         <p:spPr>
           <a:xfrm>
-            <a:off x="4809208" y="3302460"/>
+            <a:off x="4809208" y="3117500"/>
             <a:ext cx="325148" cy="325148"/>
           </a:xfrm>
           <a:prstGeom prst="rect">
@@ -5765,7 +5932,7 @@
       </p:pic>
       <p:pic>
         <p:nvPicPr>
-          <p:cNvPr id="20" name="Imagem 19"/>
+          <p:cNvPr id="23" name="Imagem 22"/>
           <p:cNvPicPr>
             <a:picLocks noChangeAspect="1"/>
           </p:cNvPicPr>
@@ -5785,7 +5952,7 @@
         </p:blipFill>
         <p:spPr>
           <a:xfrm>
-            <a:off x="5064930" y="3710092"/>
+            <a:off x="5064930" y="3525132"/>
             <a:ext cx="304762" cy="304762"/>
           </a:xfrm>
           <a:prstGeom prst="rect">
@@ -5795,7 +5962,7 @@
       </p:pic>
       <p:pic>
         <p:nvPicPr>
-          <p:cNvPr id="22" name="Imagem 21"/>
+          <p:cNvPr id="24" name="Imagem 23"/>
           <p:cNvPicPr>
             <a:picLocks noChangeAspect="1"/>
           </p:cNvPicPr>
@@ -5815,7 +5982,7 @@
         </p:blipFill>
         <p:spPr>
           <a:xfrm>
-            <a:off x="5257188" y="3407816"/>
+            <a:off x="5257188" y="3222856"/>
             <a:ext cx="325148" cy="325148"/>
           </a:xfrm>
           <a:prstGeom prst="rect">
@@ -5825,7 +5992,7 @@
       </p:pic>
       <p:pic>
         <p:nvPicPr>
-          <p:cNvPr id="3" name="Imagem 2"/>
+          <p:cNvPr id="25" name="Imagem 24"/>
           <p:cNvPicPr>
             <a:picLocks noChangeAspect="1"/>
           </p:cNvPicPr>
@@ -5845,7 +6012,7 @@
         </p:blipFill>
         <p:spPr>
           <a:xfrm>
-            <a:off x="4665005" y="4332081"/>
+            <a:off x="4665005" y="4147121"/>
             <a:ext cx="325148" cy="325148"/>
           </a:xfrm>
           <a:prstGeom prst="rect">
@@ -5855,7 +6022,7 @@
       </p:pic>
       <p:pic>
         <p:nvPicPr>
-          <p:cNvPr id="4" name="Imagem 3"/>
+          <p:cNvPr id="26" name="Imagem 25"/>
           <p:cNvPicPr>
             <a:picLocks noChangeAspect="1"/>
           </p:cNvPicPr>
@@ -5875,7 +6042,7 @@
         </p:blipFill>
         <p:spPr>
           <a:xfrm>
-            <a:off x="3759526" y="4179700"/>
+            <a:off x="3759526" y="3994740"/>
             <a:ext cx="325148" cy="325148"/>
           </a:xfrm>
           <a:prstGeom prst="rect">
@@ -5885,7 +6052,7 @@
       </p:pic>
       <p:pic>
         <p:nvPicPr>
-          <p:cNvPr id="5" name="Imagem 4"/>
+          <p:cNvPr id="27" name="Imagem 26"/>
           <p:cNvPicPr>
             <a:picLocks noChangeAspect="1"/>
           </p:cNvPicPr>
@@ -5905,7 +6072,7 @@
         </p:blipFill>
         <p:spPr>
           <a:xfrm>
-            <a:off x="4286349" y="2962806"/>
+            <a:off x="4286349" y="2777846"/>
             <a:ext cx="304762" cy="304762"/>
           </a:xfrm>
           <a:prstGeom prst="rect">
@@ -5915,13 +6082,13 @@
       </p:pic>
       <p:sp>
         <p:nvSpPr>
-          <p:cNvPr id="2" name="Símbolo de 'Não' 1"/>
+          <p:cNvPr id="28" name="Símbolo de 'Não' 27"/>
           <p:cNvSpPr/>
           <p:nvPr/>
         </p:nvSpPr>
         <p:spPr>
           <a:xfrm>
-            <a:off x="3132000" y="2331464"/>
+            <a:off x="3132000" y="2146504"/>
             <a:ext cx="2880000" cy="2880000"/>
           </a:xfrm>
           <a:prstGeom prst="noSmoking">
@@ -5965,186 +6132,10 @@
           </a:p>
         </p:txBody>
       </p:sp>
-      <p:sp>
-        <p:nvSpPr>
-          <p:cNvPr id="16" name="Título 5"/>
-          <p:cNvSpPr txBox="1">
-            <a:spLocks/>
-          </p:cNvSpPr>
-          <p:nvPr/>
-        </p:nvSpPr>
-        <p:spPr>
-          <a:xfrm>
-            <a:off x="457200" y="5337632"/>
-            <a:ext cx="8229600" cy="1143000"/>
-          </a:xfrm>
-          <a:prstGeom prst="rect">
-            <a:avLst/>
-          </a:prstGeom>
-        </p:spPr>
-        <p:txBody>
-          <a:bodyPr vert="horz" lIns="91440" tIns="45720" rIns="91440" bIns="45720" rtlCol="0" anchor="ctr">
-            <a:normAutofit/>
-          </a:bodyPr>
-          <a:lstStyle>
-            <a:defPPr>
-              <a:defRPr lang="pt-BR"/>
-            </a:defPPr>
-            <a:lvl1pPr marL="0" algn="l" defTabSz="914400" rtl="0" eaLnBrk="1" latinLnBrk="0" hangingPunct="1">
-              <a:defRPr sz="1800" kern="1200">
-                <a:solidFill>
-                  <a:schemeClr val="tx1"/>
-                </a:solidFill>
-                <a:latin typeface="+mn-lt"/>
-                <a:ea typeface="+mn-ea"/>
-                <a:cs typeface="+mn-cs"/>
-              </a:defRPr>
-            </a:lvl1pPr>
-            <a:lvl2pPr marL="457200" algn="l" defTabSz="914400" rtl="0" eaLnBrk="1" latinLnBrk="0" hangingPunct="1">
-              <a:defRPr sz="1800" kern="1200">
-                <a:solidFill>
-                  <a:schemeClr val="tx1"/>
-                </a:solidFill>
-                <a:latin typeface="+mn-lt"/>
-                <a:ea typeface="+mn-ea"/>
-                <a:cs typeface="+mn-cs"/>
-              </a:defRPr>
-            </a:lvl2pPr>
-            <a:lvl3pPr marL="914400" algn="l" defTabSz="914400" rtl="0" eaLnBrk="1" latinLnBrk="0" hangingPunct="1">
-              <a:defRPr sz="1800" kern="1200">
-                <a:solidFill>
-                  <a:schemeClr val="tx1"/>
-                </a:solidFill>
-                <a:latin typeface="+mn-lt"/>
-                <a:ea typeface="+mn-ea"/>
-                <a:cs typeface="+mn-cs"/>
-              </a:defRPr>
-            </a:lvl3pPr>
-            <a:lvl4pPr marL="1371600" algn="l" defTabSz="914400" rtl="0" eaLnBrk="1" latinLnBrk="0" hangingPunct="1">
-              <a:defRPr sz="1800" kern="1200">
-                <a:solidFill>
-                  <a:schemeClr val="tx1"/>
-                </a:solidFill>
-                <a:latin typeface="+mn-lt"/>
-                <a:ea typeface="+mn-ea"/>
-                <a:cs typeface="+mn-cs"/>
-              </a:defRPr>
-            </a:lvl4pPr>
-            <a:lvl5pPr marL="1828800" algn="l" defTabSz="914400" rtl="0" eaLnBrk="1" latinLnBrk="0" hangingPunct="1">
-              <a:defRPr sz="1800" kern="1200">
-                <a:solidFill>
-                  <a:schemeClr val="tx1"/>
-                </a:solidFill>
-                <a:latin typeface="+mn-lt"/>
-                <a:ea typeface="+mn-ea"/>
-                <a:cs typeface="+mn-cs"/>
-              </a:defRPr>
-            </a:lvl5pPr>
-            <a:lvl6pPr marL="2286000" algn="l" defTabSz="914400" rtl="0" eaLnBrk="1" latinLnBrk="0" hangingPunct="1">
-              <a:defRPr sz="1800" kern="1200">
-                <a:solidFill>
-                  <a:schemeClr val="tx1"/>
-                </a:solidFill>
-                <a:latin typeface="+mn-lt"/>
-                <a:ea typeface="+mn-ea"/>
-                <a:cs typeface="+mn-cs"/>
-              </a:defRPr>
-            </a:lvl6pPr>
-            <a:lvl7pPr marL="2743200" algn="l" defTabSz="914400" rtl="0" eaLnBrk="1" latinLnBrk="0" hangingPunct="1">
-              <a:defRPr sz="1800" kern="1200">
-                <a:solidFill>
-                  <a:schemeClr val="tx1"/>
-                </a:solidFill>
-                <a:latin typeface="+mn-lt"/>
-                <a:ea typeface="+mn-ea"/>
-                <a:cs typeface="+mn-cs"/>
-              </a:defRPr>
-            </a:lvl7pPr>
-            <a:lvl8pPr marL="3200400" algn="l" defTabSz="914400" rtl="0" eaLnBrk="1" latinLnBrk="0" hangingPunct="1">
-              <a:defRPr sz="1800" kern="1200">
-                <a:solidFill>
-                  <a:schemeClr val="tx1"/>
-                </a:solidFill>
-                <a:latin typeface="+mn-lt"/>
-                <a:ea typeface="+mn-ea"/>
-                <a:cs typeface="+mn-cs"/>
-              </a:defRPr>
-            </a:lvl8pPr>
-            <a:lvl9pPr marL="3657600" algn="l" defTabSz="914400" rtl="0" eaLnBrk="1" latinLnBrk="0" hangingPunct="1">
-              <a:defRPr sz="1800" kern="1200">
-                <a:solidFill>
-                  <a:schemeClr val="tx1"/>
-                </a:solidFill>
-                <a:latin typeface="+mn-lt"/>
-                <a:ea typeface="+mn-ea"/>
-                <a:cs typeface="+mn-cs"/>
-              </a:defRPr>
-            </a:lvl9pPr>
-          </a:lstStyle>
-          <a:p>
-            <a:pPr algn="ctr"/>
-            <a:r>
-              <a:rPr lang="pt-BR" sz="5000" dirty="0">
-                <a:latin typeface="Grinched" panose="02000000000000000000" pitchFamily="2" charset="0"/>
-              </a:rPr>
-              <a:t>Voce </a:t>
-            </a:r>
-            <a:r>
-              <a:rPr lang="pt-BR" sz="5000" dirty="0" smtClean="0">
-                <a:latin typeface="Grinched" panose="02000000000000000000" pitchFamily="2" charset="0"/>
-              </a:rPr>
-              <a:t>atingiu </a:t>
-            </a:r>
-            <a:r>
-              <a:rPr lang="pt-BR" sz="5000" dirty="0">
-                <a:latin typeface="Grinched" panose="02000000000000000000" pitchFamily="2" charset="0"/>
-              </a:rPr>
-              <a:t>5 fantasmas.</a:t>
-            </a:r>
-          </a:p>
-        </p:txBody>
-      </p:sp>
-      <p:sp>
-        <p:nvSpPr>
-          <p:cNvPr id="18" name="CaixaDeTexto 17"/>
-          <p:cNvSpPr txBox="1"/>
-          <p:nvPr/>
-        </p:nvSpPr>
-        <p:spPr>
-          <a:xfrm rot="19008857">
-            <a:off x="515002" y="614559"/>
-            <a:ext cx="1172188" cy="477054"/>
-          </a:xfrm>
-          <a:prstGeom prst="rect">
-            <a:avLst/>
-          </a:prstGeom>
-          <a:noFill/>
-        </p:spPr>
-        <p:txBody>
-          <a:bodyPr wrap="square" rtlCol="0">
-            <a:spAutoFit/>
-          </a:bodyPr>
-          <a:lstStyle/>
-          <a:p>
-            <a:r>
-              <a:rPr lang="pt-BR" sz="2500" dirty="0" smtClean="0">
-                <a:solidFill>
-                  <a:schemeClr val="bg1">
-                    <a:lumMod val="50000"/>
-                    <a:lumOff val="50000"/>
-                  </a:schemeClr>
-                </a:solidFill>
-                <a:latin typeface="Grinched" panose="02000000000000000000" pitchFamily="2" charset="0"/>
-              </a:rPr>
-              <a:t>NO-BOO</a:t>
-            </a:r>
-          </a:p>
-        </p:txBody>
-      </p:sp>
     </p:spTree>
     <p:extLst>
       <p:ext uri="{BB962C8B-B14F-4D97-AF65-F5344CB8AC3E}">
-        <p14:creationId xmlns:p14="http://schemas.microsoft.com/office/powerpoint/2010/main" val="4047422082"/>
+        <p14:creationId xmlns:p14="http://schemas.microsoft.com/office/powerpoint/2010/main" val="3628556296"/>
       </p:ext>
     </p:extLst>
   </p:cSld>
@@ -6212,7 +6203,7 @@
         </p:blipFill>
         <p:spPr>
           <a:xfrm>
-            <a:off x="2915816" y="2358855"/>
+            <a:off x="2915816" y="2127318"/>
             <a:ext cx="2457243" cy="2915056"/>
           </a:xfrm>
           <a:prstGeom prst="rect">
@@ -6230,7 +6221,7 @@
         </p:nvSpPr>
         <p:spPr>
           <a:xfrm>
-            <a:off x="457200" y="5337632"/>
+            <a:off x="457200" y="5187983"/>
             <a:ext cx="8229600" cy="1143000"/>
           </a:xfrm>
           <a:prstGeom prst="rect">
@@ -6360,7 +6351,7 @@
         </p:nvSpPr>
         <p:spPr>
           <a:xfrm>
-            <a:off x="457200" y="550545"/>
+            <a:off x="457200" y="319008"/>
             <a:ext cx="8229600" cy="1582311"/>
           </a:xfrm>
           <a:prstGeom prst="rect">
@@ -6488,7 +6479,7 @@
         </p:nvSpPr>
         <p:spPr>
           <a:xfrm>
-            <a:off x="4072429" y="2646887"/>
+            <a:off x="4072429" y="2415350"/>
             <a:ext cx="648072" cy="684000"/>
           </a:xfrm>
           <a:prstGeom prst="mathMultiply">
@@ -6536,7 +6527,7 @@
         </p:nvSpPr>
         <p:spPr>
           <a:xfrm>
-            <a:off x="5057258" y="4016648"/>
+            <a:off x="5057258" y="3785111"/>
             <a:ext cx="262800" cy="262800"/>
           </a:xfrm>
           <a:prstGeom prst="heart">
@@ -6584,7 +6575,7 @@
         </p:nvSpPr>
         <p:spPr>
           <a:xfrm>
-            <a:off x="5470497" y="4016648"/>
+            <a:off x="5470497" y="3785111"/>
             <a:ext cx="262800" cy="262800"/>
           </a:xfrm>
           <a:prstGeom prst="heart">
@@ -6632,7 +6623,7 @@
         </p:nvSpPr>
         <p:spPr>
           <a:xfrm>
-            <a:off x="5883737" y="4016648"/>
+            <a:off x="5883737" y="3785111"/>
             <a:ext cx="262800" cy="262800"/>
           </a:xfrm>
           <a:prstGeom prst="heart">
@@ -6678,7 +6669,7 @@
         </p:nvSpPr>
         <p:spPr>
           <a:xfrm>
-            <a:off x="4936525" y="3237564"/>
+            <a:off x="4936525" y="3006027"/>
             <a:ext cx="1330743" cy="699422"/>
           </a:xfrm>
           <a:prstGeom prst="rect">

</xml_diff>

<commit_message>
[asteroids][no-boo][ohhman]Splash do grupo e imagem de divulgação
</commit_message>
<xml_diff>
--- a/phaser/no-boo/assets/telas/outros/telas.pptx
+++ b/phaser/no-boo/assets/telas/outros/telas.pptx
@@ -6,11 +6,12 @@
   </p:sldMasterIdLst>
   <p:sldIdLst>
     <p:sldId id="260" r:id="rId2"/>
-    <p:sldId id="267" r:id="rId3"/>
-    <p:sldId id="266" r:id="rId4"/>
-    <p:sldId id="261" r:id="rId5"/>
-    <p:sldId id="268" r:id="rId6"/>
-    <p:sldId id="265" r:id="rId7"/>
+    <p:sldId id="269" r:id="rId3"/>
+    <p:sldId id="267" r:id="rId4"/>
+    <p:sldId id="266" r:id="rId5"/>
+    <p:sldId id="261" r:id="rId6"/>
+    <p:sldId id="268" r:id="rId7"/>
+    <p:sldId id="265" r:id="rId8"/>
   </p:sldIdLst>
   <p:sldSz cx="9144000" cy="6858000" type="screen4x3"/>
   <p:notesSz cx="6858000" cy="9144000"/>
@@ -293,7 +294,7 @@
           <a:p>
             <a:fld id="{93945A38-A22D-409E-8801-20D8F8211029}" type="datetimeFigureOut">
               <a:rPr lang="pt-BR" smtClean="0"/>
-              <a:t>06/02/2014</a:t>
+              <a:t>24/04/2014</a:t>
             </a:fld>
             <a:endParaRPr lang="pt-BR"/>
           </a:p>
@@ -463,7 +464,7 @@
           <a:p>
             <a:fld id="{93945A38-A22D-409E-8801-20D8F8211029}" type="datetimeFigureOut">
               <a:rPr lang="pt-BR" smtClean="0"/>
-              <a:t>06/02/2014</a:t>
+              <a:t>24/04/2014</a:t>
             </a:fld>
             <a:endParaRPr lang="pt-BR"/>
           </a:p>
@@ -643,7 +644,7 @@
           <a:p>
             <a:fld id="{93945A38-A22D-409E-8801-20D8F8211029}" type="datetimeFigureOut">
               <a:rPr lang="pt-BR" smtClean="0"/>
-              <a:t>06/02/2014</a:t>
+              <a:t>24/04/2014</a:t>
             </a:fld>
             <a:endParaRPr lang="pt-BR"/>
           </a:p>
@@ -813,7 +814,7 @@
           <a:p>
             <a:fld id="{93945A38-A22D-409E-8801-20D8F8211029}" type="datetimeFigureOut">
               <a:rPr lang="pt-BR" smtClean="0"/>
-              <a:t>06/02/2014</a:t>
+              <a:t>24/04/2014</a:t>
             </a:fld>
             <a:endParaRPr lang="pt-BR"/>
           </a:p>
@@ -1059,7 +1060,7 @@
           <a:p>
             <a:fld id="{93945A38-A22D-409E-8801-20D8F8211029}" type="datetimeFigureOut">
               <a:rPr lang="pt-BR" smtClean="0"/>
-              <a:t>06/02/2014</a:t>
+              <a:t>24/04/2014</a:t>
             </a:fld>
             <a:endParaRPr lang="pt-BR"/>
           </a:p>
@@ -1347,7 +1348,7 @@
           <a:p>
             <a:fld id="{93945A38-A22D-409E-8801-20D8F8211029}" type="datetimeFigureOut">
               <a:rPr lang="pt-BR" smtClean="0"/>
-              <a:t>06/02/2014</a:t>
+              <a:t>24/04/2014</a:t>
             </a:fld>
             <a:endParaRPr lang="pt-BR"/>
           </a:p>
@@ -1769,7 +1770,7 @@
           <a:p>
             <a:fld id="{93945A38-A22D-409E-8801-20D8F8211029}" type="datetimeFigureOut">
               <a:rPr lang="pt-BR" smtClean="0"/>
-              <a:t>06/02/2014</a:t>
+              <a:t>24/04/2014</a:t>
             </a:fld>
             <a:endParaRPr lang="pt-BR"/>
           </a:p>
@@ -1887,7 +1888,7 @@
           <a:p>
             <a:fld id="{93945A38-A22D-409E-8801-20D8F8211029}" type="datetimeFigureOut">
               <a:rPr lang="pt-BR" smtClean="0"/>
-              <a:t>06/02/2014</a:t>
+              <a:t>24/04/2014</a:t>
             </a:fld>
             <a:endParaRPr lang="pt-BR"/>
           </a:p>
@@ -1982,7 +1983,7 @@
           <a:p>
             <a:fld id="{93945A38-A22D-409E-8801-20D8F8211029}" type="datetimeFigureOut">
               <a:rPr lang="pt-BR" smtClean="0"/>
-              <a:t>06/02/2014</a:t>
+              <a:t>24/04/2014</a:t>
             </a:fld>
             <a:endParaRPr lang="pt-BR"/>
           </a:p>
@@ -2259,7 +2260,7 @@
           <a:p>
             <a:fld id="{93945A38-A22D-409E-8801-20D8F8211029}" type="datetimeFigureOut">
               <a:rPr lang="pt-BR" smtClean="0"/>
-              <a:t>06/02/2014</a:t>
+              <a:t>24/04/2014</a:t>
             </a:fld>
             <a:endParaRPr lang="pt-BR"/>
           </a:p>
@@ -2512,7 +2513,7 @@
           <a:p>
             <a:fld id="{93945A38-A22D-409E-8801-20D8F8211029}" type="datetimeFigureOut">
               <a:rPr lang="pt-BR" smtClean="0"/>
-              <a:t>06/02/2014</a:t>
+              <a:t>24/04/2014</a:t>
             </a:fld>
             <a:endParaRPr lang="pt-BR"/>
           </a:p>
@@ -2725,7 +2726,7 @@
           <a:p>
             <a:fld id="{93945A38-A22D-409E-8801-20D8F8211029}" type="datetimeFigureOut">
               <a:rPr lang="pt-BR" smtClean="0"/>
-              <a:t>06/02/2014</a:t>
+              <a:t>24/04/2014</a:t>
             </a:fld>
             <a:endParaRPr lang="pt-BR"/>
           </a:p>
@@ -3721,26 +3722,56 @@
           <a:chExt cx="0" cy="0"/>
         </a:xfrm>
       </p:grpSpPr>
-      <p:sp>
-        <p:nvSpPr>
-          <p:cNvPr id="7" name="Título 5"/>
-          <p:cNvSpPr txBox="1">
-            <a:spLocks/>
-          </p:cNvSpPr>
+      <p:pic>
+        <p:nvPicPr>
+          <p:cNvPr id="2" name="Imagem 1"/>
+          <p:cNvPicPr>
+            <a:picLocks noChangeAspect="1"/>
+          </p:cNvPicPr>
           <p:nvPr/>
-        </p:nvSpPr>
-        <p:spPr>
-          <a:xfrm>
-            <a:off x="457200" y="550545"/>
-            <a:ext cx="8229600" cy="1582311"/>
+        </p:nvPicPr>
+        <p:blipFill>
+          <a:blip r:embed="rId2">
+            <a:extLst>
+              <a:ext uri="{28A0092B-C50C-407E-A947-70E740481C1C}">
+                <a14:useLocalDpi xmlns:a14="http://schemas.microsoft.com/office/drawing/2010/main" val="0"/>
+              </a:ext>
+            </a:extLst>
+          </a:blip>
+          <a:stretch>
+            <a:fillRect/>
+          </a:stretch>
+        </p:blipFill>
+        <p:spPr>
+          <a:xfrm>
+            <a:off x="3619619" y="2476619"/>
+            <a:ext cx="1904762" cy="1904762"/>
           </a:xfrm>
           <a:prstGeom prst="rect">
             <a:avLst/>
           </a:prstGeom>
         </p:spPr>
+      </p:pic>
+      <p:sp>
+        <p:nvSpPr>
+          <p:cNvPr id="15" name="Título 5"/>
+          <p:cNvSpPr txBox="1">
+            <a:spLocks/>
+          </p:cNvSpPr>
+          <p:nvPr/>
+        </p:nvSpPr>
+        <p:spPr>
+          <a:xfrm>
+            <a:off x="3619500" y="2996952"/>
+            <a:ext cx="1905000" cy="504056"/>
+          </a:xfrm>
+          <a:prstGeom prst="rect">
+            <a:avLst/>
+          </a:prstGeom>
+        </p:spPr>
         <p:txBody>
           <a:bodyPr vert="horz" lIns="91440" tIns="45720" rIns="91440" bIns="45720" rtlCol="0" anchor="ctr">
-            <a:normAutofit/>
+            <a:noAutofit/>
           </a:bodyPr>
           <a:lstStyle>
             <a:defPPr>
@@ -3840,19 +3871,25 @@
           <a:p>
             <a:pPr algn="ctr"/>
             <a:r>
-              <a:rPr lang="pt-BR" sz="7500" dirty="0" smtClean="0">
+              <a:rPr lang="pt-BR" sz="2700" b="1" dirty="0" smtClean="0">
+                <a:solidFill>
+                  <a:schemeClr val="bg1"/>
+                </a:solidFill>
                 <a:latin typeface="Halloween" pitchFamily="2" charset="0"/>
               </a:rPr>
               <a:t>No</a:t>
             </a:r>
             <a:r>
-              <a:rPr lang="pt-BR" sz="5000" dirty="0" smtClean="0">
-                <a:latin typeface="Andy" panose="03080602030302030203" pitchFamily="66" charset="0"/>
+              <a:rPr lang="pt-BR" sz="2000" b="1" dirty="0" smtClean="0">
+                <a:solidFill>
+                  <a:schemeClr val="bg1"/>
+                </a:solidFill>
+                <a:latin typeface="Georgia" panose="02040502050405020303" pitchFamily="18" charset="0"/>
               </a:rPr>
               <a:t>-</a:t>
             </a:r>
             <a:r>
-              <a:rPr lang="pt-BR" sz="7500" dirty="0" smtClean="0">
+              <a:rPr lang="pt-BR" sz="2700" dirty="0" smtClean="0">
                 <a:solidFill>
                   <a:schemeClr val="accent2"/>
                 </a:solidFill>
@@ -3860,7 +3897,7 @@
               </a:rPr>
               <a:t>BOO</a:t>
             </a:r>
-            <a:endParaRPr lang="pt-BR" sz="7500" dirty="0">
+            <a:endParaRPr lang="pt-BR" sz="2700" dirty="0">
               <a:solidFill>
                 <a:schemeClr val="accent2"/>
               </a:solidFill>
@@ -3869,47 +3906,175 @@
           </a:p>
         </p:txBody>
       </p:sp>
-      <p:sp>
-        <p:nvSpPr>
-          <p:cNvPr id="18" name="CaixaDeTexto 17"/>
-          <p:cNvSpPr txBox="1"/>
+      <p:grpSp>
+        <p:nvGrpSpPr>
+          <p:cNvPr id="5" name="Grupo 4"/>
+          <p:cNvGrpSpPr/>
           <p:nvPr/>
-        </p:nvSpPr>
-        <p:spPr>
-          <a:xfrm rot="19008857">
-            <a:off x="515002" y="614559"/>
-            <a:ext cx="1172188" cy="477054"/>
-          </a:xfrm>
-          <a:prstGeom prst="rect">
-            <a:avLst/>
-          </a:prstGeom>
-          <a:noFill/>
-        </p:spPr>
-        <p:txBody>
-          <a:bodyPr wrap="square" rtlCol="0">
-            <a:spAutoFit/>
-          </a:bodyPr>
-          <a:lstStyle/>
-          <a:p>
-            <a:r>
-              <a:rPr lang="pt-BR" sz="2500" dirty="0" smtClean="0">
-                <a:solidFill>
-                  <a:schemeClr val="bg1">
-                    <a:lumMod val="50000"/>
-                    <a:lumOff val="50000"/>
-                  </a:schemeClr>
-                </a:solidFill>
-                <a:latin typeface="Grinched" panose="02000000000000000000" pitchFamily="2" charset="0"/>
-              </a:rPr>
-              <a:t>NO-BOO</a:t>
-            </a:r>
-          </a:p>
-        </p:txBody>
-      </p:sp>
+        </p:nvGrpSpPr>
+        <p:grpSpPr>
+          <a:xfrm>
+            <a:off x="3990598" y="3526232"/>
+            <a:ext cx="1162804" cy="190800"/>
+            <a:chOff x="4006500" y="3526232"/>
+            <a:chExt cx="1162804" cy="190800"/>
+          </a:xfrm>
+        </p:grpSpPr>
+        <p:pic>
+          <p:nvPicPr>
+            <p:cNvPr id="16" name="Imagem 15"/>
+            <p:cNvPicPr>
+              <a:picLocks noChangeAspect="1"/>
+            </p:cNvPicPr>
+            <p:nvPr/>
+          </p:nvPicPr>
+          <p:blipFill>
+            <a:blip r:embed="rId3">
+              <a:extLst>
+                <a:ext uri="{28A0092B-C50C-407E-A947-70E740481C1C}">
+                  <a14:useLocalDpi xmlns:a14="http://schemas.microsoft.com/office/drawing/2010/main" val="0"/>
+                </a:ext>
+              </a:extLst>
+            </a:blip>
+            <a:stretch>
+              <a:fillRect/>
+            </a:stretch>
+          </p:blipFill>
+          <p:spPr>
+            <a:xfrm>
+              <a:off x="4249501" y="3526232"/>
+              <a:ext cx="190800" cy="190800"/>
+            </a:xfrm>
+            <a:prstGeom prst="rect">
+              <a:avLst/>
+            </a:prstGeom>
+          </p:spPr>
+        </p:pic>
+        <p:pic>
+          <p:nvPicPr>
+            <p:cNvPr id="17" name="Imagem 16"/>
+            <p:cNvPicPr>
+              <a:picLocks noChangeAspect="1"/>
+            </p:cNvPicPr>
+            <p:nvPr/>
+          </p:nvPicPr>
+          <p:blipFill>
+            <a:blip r:embed="rId4">
+              <a:extLst>
+                <a:ext uri="{28A0092B-C50C-407E-A947-70E740481C1C}">
+                  <a14:useLocalDpi xmlns:a14="http://schemas.microsoft.com/office/drawing/2010/main" val="0"/>
+                </a:ext>
+              </a:extLst>
+            </a:blip>
+            <a:stretch>
+              <a:fillRect/>
+            </a:stretch>
+          </p:blipFill>
+          <p:spPr>
+            <a:xfrm>
+              <a:off x="4978504" y="3526232"/>
+              <a:ext cx="190800" cy="190800"/>
+            </a:xfrm>
+            <a:prstGeom prst="rect">
+              <a:avLst/>
+            </a:prstGeom>
+          </p:spPr>
+        </p:pic>
+        <p:pic>
+          <p:nvPicPr>
+            <p:cNvPr id="18" name="Imagem 17"/>
+            <p:cNvPicPr>
+              <a:picLocks noChangeAspect="1"/>
+            </p:cNvPicPr>
+            <p:nvPr/>
+          </p:nvPicPr>
+          <p:blipFill>
+            <a:blip r:embed="rId5">
+              <a:extLst>
+                <a:ext uri="{28A0092B-C50C-407E-A947-70E740481C1C}">
+                  <a14:useLocalDpi xmlns:a14="http://schemas.microsoft.com/office/drawing/2010/main" val="0"/>
+                </a:ext>
+              </a:extLst>
+            </a:blip>
+            <a:stretch>
+              <a:fillRect/>
+            </a:stretch>
+          </p:blipFill>
+          <p:spPr>
+            <a:xfrm>
+              <a:off x="4492502" y="3526232"/>
+              <a:ext cx="190800" cy="190800"/>
+            </a:xfrm>
+            <a:prstGeom prst="rect">
+              <a:avLst/>
+            </a:prstGeom>
+          </p:spPr>
+        </p:pic>
+        <p:pic>
+          <p:nvPicPr>
+            <p:cNvPr id="19" name="Imagem 18"/>
+            <p:cNvPicPr>
+              <a:picLocks noChangeAspect="1"/>
+            </p:cNvPicPr>
+            <p:nvPr/>
+          </p:nvPicPr>
+          <p:blipFill>
+            <a:blip r:embed="rId6">
+              <a:extLst>
+                <a:ext uri="{28A0092B-C50C-407E-A947-70E740481C1C}">
+                  <a14:useLocalDpi xmlns:a14="http://schemas.microsoft.com/office/drawing/2010/main" val="0"/>
+                </a:ext>
+              </a:extLst>
+            </a:blip>
+            <a:stretch>
+              <a:fillRect/>
+            </a:stretch>
+          </p:blipFill>
+          <p:spPr>
+            <a:xfrm>
+              <a:off x="4735503" y="3526232"/>
+              <a:ext cx="190800" cy="190800"/>
+            </a:xfrm>
+            <a:prstGeom prst="rect">
+              <a:avLst/>
+            </a:prstGeom>
+          </p:spPr>
+        </p:pic>
+        <p:pic>
+          <p:nvPicPr>
+            <p:cNvPr id="20" name="Imagem 19"/>
+            <p:cNvPicPr>
+              <a:picLocks noChangeAspect="1"/>
+            </p:cNvPicPr>
+            <p:nvPr/>
+          </p:nvPicPr>
+          <p:blipFill>
+            <a:blip r:embed="rId7">
+              <a:extLst>
+                <a:ext uri="{28A0092B-C50C-407E-A947-70E740481C1C}">
+                  <a14:useLocalDpi xmlns:a14="http://schemas.microsoft.com/office/drawing/2010/main" val="0"/>
+                </a:ext>
+              </a:extLst>
+            </a:blip>
+            <a:stretch>
+              <a:fillRect/>
+            </a:stretch>
+          </p:blipFill>
+          <p:spPr>
+            <a:xfrm>
+              <a:off x="4006500" y="3526232"/>
+              <a:ext cx="190800" cy="190800"/>
+            </a:xfrm>
+            <a:prstGeom prst="rect">
+              <a:avLst/>
+            </a:prstGeom>
+          </p:spPr>
+        </p:pic>
+      </p:grpSp>
     </p:spTree>
     <p:extLst>
       <p:ext uri="{BB962C8B-B14F-4D97-AF65-F5344CB8AC3E}">
-        <p14:creationId xmlns:p14="http://schemas.microsoft.com/office/powerpoint/2010/main" val="757144499"/>
+        <p14:creationId xmlns:p14="http://schemas.microsoft.com/office/powerpoint/2010/main" val="2300032031"/>
       </p:ext>
     </p:extLst>
   </p:cSld>
@@ -3957,7 +4122,7 @@
       </p:grpSpPr>
       <p:sp>
         <p:nvSpPr>
-          <p:cNvPr id="6" name="Título 5"/>
+          <p:cNvPr id="7" name="Título 5"/>
           <p:cNvSpPr txBox="1">
             <a:spLocks/>
           </p:cNvSpPr>
@@ -3965,8 +4130,8 @@
         </p:nvSpPr>
         <p:spPr>
           <a:xfrm>
-            <a:off x="457200" y="2024092"/>
-            <a:ext cx="8229600" cy="4536503"/>
+            <a:off x="457200" y="550545"/>
+            <a:ext cx="8229600" cy="1582311"/>
           </a:xfrm>
           <a:prstGeom prst="rect">
             <a:avLst/>
@@ -3974,7 +4139,7 @@
         </p:spPr>
         <p:txBody>
           <a:bodyPr vert="horz" lIns="91440" tIns="45720" rIns="91440" bIns="45720" rtlCol="0" anchor="ctr">
-            <a:noAutofit/>
+            <a:normAutofit/>
           </a:bodyPr>
           <a:lstStyle>
             <a:defPPr>
@@ -4072,239 +4237,31 @@
             </a:lvl9pPr>
           </a:lstStyle>
           <a:p>
-            <a:pPr algn="ctr">
-              <a:lnSpc>
-                <a:spcPct val="125000"/>
-              </a:lnSpc>
-            </a:pPr>
-            <a:r>
-              <a:rPr lang="pt-BR" sz="3500" dirty="0" smtClean="0">
-                <a:latin typeface="Grinched" panose="02000000000000000000" pitchFamily="2" charset="0"/>
-              </a:rPr>
-              <a:t>Atinja os </a:t>
-            </a:r>
-            <a:r>
-              <a:rPr lang="pt-BR" sz="5000" b="1" dirty="0" smtClean="0">
-                <a:latin typeface="Grinched" panose="02000000000000000000" pitchFamily="2" charset="0"/>
-              </a:rPr>
-              <a:t>fantasminhas</a:t>
-            </a:r>
-            <a:r>
-              <a:rPr lang="pt-BR" sz="3500" dirty="0" smtClean="0">
-                <a:latin typeface="Grinched" panose="02000000000000000000" pitchFamily="2" charset="0"/>
-              </a:rPr>
-              <a:t>.</a:t>
-            </a:r>
-          </a:p>
-          <a:p>
-            <a:pPr algn="ctr">
-              <a:lnSpc>
-                <a:spcPct val="125000"/>
-              </a:lnSpc>
-            </a:pPr>
-            <a:r>
-              <a:rPr lang="pt-BR" sz="3500" dirty="0" smtClean="0">
-                <a:latin typeface="Grinched" panose="02000000000000000000" pitchFamily="2" charset="0"/>
-              </a:rPr>
-              <a:t>Evite o pac-man!</a:t>
-            </a:r>
-          </a:p>
-          <a:p>
-            <a:pPr algn="ctr">
-              <a:lnSpc>
-                <a:spcPct val="125000"/>
-              </a:lnSpc>
-            </a:pPr>
-            <a:r>
-              <a:rPr lang="pt-BR" sz="3500" dirty="0" smtClean="0">
-                <a:latin typeface="Grinched" panose="02000000000000000000" pitchFamily="2" charset="0"/>
-              </a:rPr>
-              <a:t>Fique de olho no cronometro...	</a:t>
-            </a:r>
-            <a:r>
-              <a:rPr lang="pt-BR" sz="3500" dirty="0" smtClean="0">
-                <a:solidFill>
-                  <a:schemeClr val="bg1">
-                    <a:lumMod val="65000"/>
-                    <a:lumOff val="35000"/>
-                  </a:schemeClr>
-                </a:solidFill>
-                <a:latin typeface="Grinched" panose="02000000000000000000" pitchFamily="2" charset="0"/>
-              </a:rPr>
-              <a:t>00:30</a:t>
-            </a:r>
-          </a:p>
-          <a:p>
-            <a:pPr>
-              <a:lnSpc>
-                <a:spcPct val="125000"/>
-              </a:lnSpc>
-            </a:pPr>
-            <a:r>
-              <a:rPr lang="pt-BR" sz="3500" dirty="0" smtClean="0">
-                <a:latin typeface="Grinched" panose="02000000000000000000" pitchFamily="2" charset="0"/>
-              </a:rPr>
-              <a:t>	       Voce dispoe de 3 vidas.</a:t>
-            </a:r>
-          </a:p>
-          <a:p>
-            <a:pPr algn="ctr">
-              <a:lnSpc>
-                <a:spcPct val="110000"/>
-              </a:lnSpc>
-            </a:pPr>
-            <a:endParaRPr lang="pt-BR" sz="2000" dirty="0" smtClean="0">
-              <a:latin typeface="Grinched" panose="02000000000000000000" pitchFamily="2" charset="0"/>
-            </a:endParaRPr>
-          </a:p>
-          <a:p>
-            <a:pPr algn="ctr">
-              <a:lnSpc>
-                <a:spcPct val="110000"/>
-              </a:lnSpc>
-            </a:pPr>
-            <a:r>
-              <a:rPr lang="pt-BR" sz="5000" dirty="0" smtClean="0">
-                <a:solidFill>
-                  <a:schemeClr val="accent2"/>
-                </a:solidFill>
-                <a:latin typeface="Grinched" panose="02000000000000000000" pitchFamily="2" charset="0"/>
-              </a:rPr>
-              <a:t>Divirta-se!</a:t>
-            </a:r>
-          </a:p>
-        </p:txBody>
-      </p:sp>
-      <p:sp>
-        <p:nvSpPr>
-          <p:cNvPr id="7" name="Título 5"/>
-          <p:cNvSpPr txBox="1">
-            <a:spLocks/>
-          </p:cNvSpPr>
-          <p:nvPr/>
-        </p:nvSpPr>
-        <p:spPr>
-          <a:xfrm>
-            <a:off x="457200" y="404664"/>
-            <a:ext cx="8229600" cy="1078255"/>
-          </a:xfrm>
-          <a:prstGeom prst="rect">
-            <a:avLst/>
-          </a:prstGeom>
-        </p:spPr>
-        <p:txBody>
-          <a:bodyPr vert="horz" lIns="91440" tIns="45720" rIns="91440" bIns="45720" rtlCol="0" anchor="ctr">
-            <a:normAutofit lnSpcReduction="10000"/>
-          </a:bodyPr>
-          <a:lstStyle>
-            <a:defPPr>
-              <a:defRPr lang="pt-BR"/>
-            </a:defPPr>
-            <a:lvl1pPr marL="0" algn="l" defTabSz="914400" rtl="0" eaLnBrk="1" latinLnBrk="0" hangingPunct="1">
-              <a:defRPr sz="1800" kern="1200">
-                <a:solidFill>
-                  <a:schemeClr val="tx1"/>
-                </a:solidFill>
-                <a:latin typeface="+mn-lt"/>
-                <a:ea typeface="+mn-ea"/>
-                <a:cs typeface="+mn-cs"/>
-              </a:defRPr>
-            </a:lvl1pPr>
-            <a:lvl2pPr marL="457200" algn="l" defTabSz="914400" rtl="0" eaLnBrk="1" latinLnBrk="0" hangingPunct="1">
-              <a:defRPr sz="1800" kern="1200">
-                <a:solidFill>
-                  <a:schemeClr val="tx1"/>
-                </a:solidFill>
-                <a:latin typeface="+mn-lt"/>
-                <a:ea typeface="+mn-ea"/>
-                <a:cs typeface="+mn-cs"/>
-              </a:defRPr>
-            </a:lvl2pPr>
-            <a:lvl3pPr marL="914400" algn="l" defTabSz="914400" rtl="0" eaLnBrk="1" latinLnBrk="0" hangingPunct="1">
-              <a:defRPr sz="1800" kern="1200">
-                <a:solidFill>
-                  <a:schemeClr val="tx1"/>
-                </a:solidFill>
-                <a:latin typeface="+mn-lt"/>
-                <a:ea typeface="+mn-ea"/>
-                <a:cs typeface="+mn-cs"/>
-              </a:defRPr>
-            </a:lvl3pPr>
-            <a:lvl4pPr marL="1371600" algn="l" defTabSz="914400" rtl="0" eaLnBrk="1" latinLnBrk="0" hangingPunct="1">
-              <a:defRPr sz="1800" kern="1200">
-                <a:solidFill>
-                  <a:schemeClr val="tx1"/>
-                </a:solidFill>
-                <a:latin typeface="+mn-lt"/>
-                <a:ea typeface="+mn-ea"/>
-                <a:cs typeface="+mn-cs"/>
-              </a:defRPr>
-            </a:lvl4pPr>
-            <a:lvl5pPr marL="1828800" algn="l" defTabSz="914400" rtl="0" eaLnBrk="1" latinLnBrk="0" hangingPunct="1">
-              <a:defRPr sz="1800" kern="1200">
-                <a:solidFill>
-                  <a:schemeClr val="tx1"/>
-                </a:solidFill>
-                <a:latin typeface="+mn-lt"/>
-                <a:ea typeface="+mn-ea"/>
-                <a:cs typeface="+mn-cs"/>
-              </a:defRPr>
-            </a:lvl5pPr>
-            <a:lvl6pPr marL="2286000" algn="l" defTabSz="914400" rtl="0" eaLnBrk="1" latinLnBrk="0" hangingPunct="1">
-              <a:defRPr sz="1800" kern="1200">
-                <a:solidFill>
-                  <a:schemeClr val="tx1"/>
-                </a:solidFill>
-                <a:latin typeface="+mn-lt"/>
-                <a:ea typeface="+mn-ea"/>
-                <a:cs typeface="+mn-cs"/>
-              </a:defRPr>
-            </a:lvl6pPr>
-            <a:lvl7pPr marL="2743200" algn="l" defTabSz="914400" rtl="0" eaLnBrk="1" latinLnBrk="0" hangingPunct="1">
-              <a:defRPr sz="1800" kern="1200">
-                <a:solidFill>
-                  <a:schemeClr val="tx1"/>
-                </a:solidFill>
-                <a:latin typeface="+mn-lt"/>
-                <a:ea typeface="+mn-ea"/>
-                <a:cs typeface="+mn-cs"/>
-              </a:defRPr>
-            </a:lvl7pPr>
-            <a:lvl8pPr marL="3200400" algn="l" defTabSz="914400" rtl="0" eaLnBrk="1" latinLnBrk="0" hangingPunct="1">
-              <a:defRPr sz="1800" kern="1200">
-                <a:solidFill>
-                  <a:schemeClr val="tx1"/>
-                </a:solidFill>
-                <a:latin typeface="+mn-lt"/>
-                <a:ea typeface="+mn-ea"/>
-                <a:cs typeface="+mn-cs"/>
-              </a:defRPr>
-            </a:lvl8pPr>
-            <a:lvl9pPr marL="3657600" algn="l" defTabSz="914400" rtl="0" eaLnBrk="1" latinLnBrk="0" hangingPunct="1">
-              <a:defRPr sz="1800" kern="1200">
-                <a:solidFill>
-                  <a:schemeClr val="tx1"/>
-                </a:solidFill>
-                <a:latin typeface="+mn-lt"/>
-                <a:ea typeface="+mn-ea"/>
-                <a:cs typeface="+mn-cs"/>
-              </a:defRPr>
-            </a:lvl9pPr>
-          </a:lstStyle>
-          <a:p>
             <a:pPr algn="ctr"/>
             <a:r>
-              <a:rPr lang="pt-BR" sz="7000" dirty="0" smtClean="0">
-                <a:solidFill>
-                  <a:schemeClr val="accent1"/>
-                </a:solidFill>
+              <a:rPr lang="pt-BR" sz="7500" dirty="0" smtClean="0">
                 <a:latin typeface="Halloween" pitchFamily="2" charset="0"/>
               </a:rPr>
-              <a:t>Como Jogar</a:t>
-            </a:r>
-            <a:endParaRPr lang="pt-BR" sz="7000" dirty="0">
+              <a:t>No</a:t>
+            </a:r>
+            <a:r>
+              <a:rPr lang="pt-BR" sz="5000" dirty="0" smtClean="0">
+                <a:latin typeface="Andy" panose="03080602030302030203" pitchFamily="66" charset="0"/>
+              </a:rPr>
+              <a:t>-</a:t>
+            </a:r>
+            <a:r>
+              <a:rPr lang="pt-BR" sz="7500" dirty="0" smtClean="0">
+                <a:solidFill>
+                  <a:schemeClr val="accent2"/>
+                </a:solidFill>
+                <a:latin typeface="Halloween" pitchFamily="2" charset="0"/>
+              </a:rPr>
+              <a:t>BOO</a:t>
+            </a:r>
+            <a:endParaRPr lang="pt-BR" sz="7500" dirty="0">
               <a:solidFill>
-                <a:schemeClr val="accent1"/>
+                <a:schemeClr val="accent2"/>
               </a:solidFill>
               <a:latin typeface="Halloween" pitchFamily="2" charset="0"/>
             </a:endParaRPr>
@@ -4313,7 +4270,7 @@
       </p:sp>
       <p:sp>
         <p:nvSpPr>
-          <p:cNvPr id="11" name="CaixaDeTexto 10"/>
+          <p:cNvPr id="18" name="CaixaDeTexto 17"/>
           <p:cNvSpPr txBox="1"/>
           <p:nvPr/>
         </p:nvSpPr>
@@ -4348,370 +4305,10 @@
           </a:p>
         </p:txBody>
       </p:sp>
-      <p:pic>
-        <p:nvPicPr>
-          <p:cNvPr id="8" name="Imagem 7"/>
-          <p:cNvPicPr>
-            <a:picLocks noChangeAspect="1"/>
-          </p:cNvPicPr>
-          <p:nvPr/>
-        </p:nvPicPr>
-        <p:blipFill>
-          <a:blip r:embed="rId2">
-            <a:extLst>
-              <a:ext uri="{28A0092B-C50C-407E-A947-70E740481C1C}">
-                <a14:useLocalDpi xmlns:a14="http://schemas.microsoft.com/office/drawing/2010/main" val="0"/>
-              </a:ext>
-            </a:extLst>
-          </a:blip>
-          <a:stretch>
-            <a:fillRect/>
-          </a:stretch>
-        </p:blipFill>
-        <p:spPr>
-          <a:xfrm>
-            <a:off x="3840241" y="1443840"/>
-            <a:ext cx="325148" cy="325148"/>
-          </a:xfrm>
-          <a:prstGeom prst="rect">
-            <a:avLst/>
-          </a:prstGeom>
-        </p:spPr>
-      </p:pic>
-      <p:pic>
-        <p:nvPicPr>
-          <p:cNvPr id="9" name="Imagem 8"/>
-          <p:cNvPicPr>
-            <a:picLocks noChangeAspect="1"/>
-          </p:cNvPicPr>
-          <p:nvPr/>
-        </p:nvPicPr>
-        <p:blipFill>
-          <a:blip r:embed="rId3">
-            <a:extLst>
-              <a:ext uri="{28A0092B-C50C-407E-A947-70E740481C1C}">
-                <a14:useLocalDpi xmlns:a14="http://schemas.microsoft.com/office/drawing/2010/main" val="0"/>
-              </a:ext>
-            </a:extLst>
-          </a:blip>
-          <a:stretch>
-            <a:fillRect/>
-          </a:stretch>
-        </p:blipFill>
-        <p:spPr>
-          <a:xfrm>
-            <a:off x="5531174" y="1443840"/>
-            <a:ext cx="325148" cy="325148"/>
-          </a:xfrm>
-          <a:prstGeom prst="rect">
-            <a:avLst/>
-          </a:prstGeom>
-        </p:spPr>
-      </p:pic>
-      <p:pic>
-        <p:nvPicPr>
-          <p:cNvPr id="10" name="Imagem 9"/>
-          <p:cNvPicPr>
-            <a:picLocks noChangeAspect="1"/>
-          </p:cNvPicPr>
-          <p:nvPr/>
-        </p:nvPicPr>
-        <p:blipFill>
-          <a:blip r:embed="rId4">
-            <a:extLst>
-              <a:ext uri="{28A0092B-C50C-407E-A947-70E740481C1C}">
-                <a14:useLocalDpi xmlns:a14="http://schemas.microsoft.com/office/drawing/2010/main" val="0"/>
-              </a:ext>
-            </a:extLst>
-          </a:blip>
-          <a:stretch>
-            <a:fillRect/>
-          </a:stretch>
-        </p:blipFill>
-        <p:spPr>
-          <a:xfrm>
-            <a:off x="4417476" y="1454033"/>
-            <a:ext cx="304762" cy="304762"/>
-          </a:xfrm>
-          <a:prstGeom prst="rect">
-            <a:avLst/>
-          </a:prstGeom>
-        </p:spPr>
-      </p:pic>
-      <p:pic>
-        <p:nvPicPr>
-          <p:cNvPr id="12" name="Imagem 11"/>
-          <p:cNvPicPr>
-            <a:picLocks noChangeAspect="1"/>
-          </p:cNvPicPr>
-          <p:nvPr/>
-        </p:nvPicPr>
-        <p:blipFill>
-          <a:blip r:embed="rId5">
-            <a:extLst>
-              <a:ext uri="{28A0092B-C50C-407E-A947-70E740481C1C}">
-                <a14:useLocalDpi xmlns:a14="http://schemas.microsoft.com/office/drawing/2010/main" val="0"/>
-              </a:ext>
-            </a:extLst>
-          </a:blip>
-          <a:stretch>
-            <a:fillRect/>
-          </a:stretch>
-        </p:blipFill>
-        <p:spPr>
-          <a:xfrm>
-            <a:off x="4974325" y="1454033"/>
-            <a:ext cx="304762" cy="304762"/>
-          </a:xfrm>
-          <a:prstGeom prst="rect">
-            <a:avLst/>
-          </a:prstGeom>
-        </p:spPr>
-      </p:pic>
-      <p:pic>
-        <p:nvPicPr>
-          <p:cNvPr id="13" name="Imagem 12"/>
-          <p:cNvPicPr>
-            <a:picLocks noChangeAspect="1"/>
-          </p:cNvPicPr>
-          <p:nvPr/>
-        </p:nvPicPr>
-        <p:blipFill>
-          <a:blip r:embed="rId6">
-            <a:extLst>
-              <a:ext uri="{28A0092B-C50C-407E-A947-70E740481C1C}">
-                <a14:useLocalDpi xmlns:a14="http://schemas.microsoft.com/office/drawing/2010/main" val="0"/>
-              </a:ext>
-            </a:extLst>
-          </a:blip>
-          <a:stretch>
-            <a:fillRect/>
-          </a:stretch>
-        </p:blipFill>
-        <p:spPr>
-          <a:xfrm>
-            <a:off x="3283392" y="1454033"/>
-            <a:ext cx="304762" cy="304762"/>
-          </a:xfrm>
-          <a:prstGeom prst="rect">
-            <a:avLst/>
-          </a:prstGeom>
-        </p:spPr>
-      </p:pic>
-      <p:pic>
-        <p:nvPicPr>
-          <p:cNvPr id="2" name="Imagem 1"/>
-          <p:cNvPicPr>
-            <a:picLocks noChangeAspect="1"/>
-          </p:cNvPicPr>
-          <p:nvPr/>
-        </p:nvPicPr>
-        <p:blipFill>
-          <a:blip r:embed="rId7">
-            <a:extLst>
-              <a:ext uri="{28A0092B-C50C-407E-A947-70E740481C1C}">
-                <a14:useLocalDpi xmlns:a14="http://schemas.microsoft.com/office/drawing/2010/main" val="0"/>
-              </a:ext>
-            </a:extLst>
-          </a:blip>
-          <a:stretch>
-            <a:fillRect/>
-          </a:stretch>
-        </p:blipFill>
-        <p:spPr>
-          <a:xfrm rot="10800000">
-            <a:off x="5940152" y="3370640"/>
-            <a:ext cx="314286" cy="304762"/>
-          </a:xfrm>
-          <a:prstGeom prst="rect">
-            <a:avLst/>
-          </a:prstGeom>
-        </p:spPr>
-      </p:pic>
-      <p:pic>
-        <p:nvPicPr>
-          <p:cNvPr id="3" name="Imagem 2"/>
-          <p:cNvPicPr>
-            <a:picLocks noChangeAspect="1"/>
-          </p:cNvPicPr>
-          <p:nvPr/>
-        </p:nvPicPr>
-        <p:blipFill>
-          <a:blip r:embed="rId8">
-            <a:extLst>
-              <a:ext uri="{28A0092B-C50C-407E-A947-70E740481C1C}">
-                <a14:useLocalDpi xmlns:a14="http://schemas.microsoft.com/office/drawing/2010/main" val="0"/>
-              </a:ext>
-            </a:extLst>
-          </a:blip>
-          <a:stretch>
-            <a:fillRect/>
-          </a:stretch>
-        </p:blipFill>
-        <p:spPr>
-          <a:xfrm>
-            <a:off x="2843808" y="3343344"/>
-            <a:ext cx="314286" cy="304762"/>
-          </a:xfrm>
-          <a:prstGeom prst="rect">
-            <a:avLst/>
-          </a:prstGeom>
-        </p:spPr>
-      </p:pic>
-      <p:sp>
-        <p:nvSpPr>
-          <p:cNvPr id="29" name="Coração 28"/>
-          <p:cNvSpPr>
-            <a:spLocks/>
-          </p:cNvSpPr>
-          <p:nvPr/>
-        </p:nvSpPr>
-        <p:spPr>
-          <a:xfrm>
-            <a:off x="5796136" y="4723080"/>
-            <a:ext cx="262800" cy="262800"/>
-          </a:xfrm>
-          <a:prstGeom prst="heart">
-            <a:avLst/>
-          </a:prstGeom>
-          <a:solidFill>
-            <a:srgbClr val="FF0000"/>
-          </a:solidFill>
-          <a:ln>
-            <a:solidFill>
-              <a:srgbClr val="FF0000"/>
-            </a:solidFill>
-          </a:ln>
-        </p:spPr>
-        <p:style>
-          <a:lnRef idx="2">
-            <a:schemeClr val="accent1">
-              <a:shade val="50000"/>
-            </a:schemeClr>
-          </a:lnRef>
-          <a:fillRef idx="1">
-            <a:schemeClr val="accent1"/>
-          </a:fillRef>
-          <a:effectRef idx="0">
-            <a:schemeClr val="accent1"/>
-          </a:effectRef>
-          <a:fontRef idx="minor">
-            <a:schemeClr val="lt1"/>
-          </a:fontRef>
-        </p:style>
-        <p:txBody>
-          <a:bodyPr rtlCol="0" anchor="ctr"/>
-          <a:lstStyle/>
-          <a:p>
-            <a:pPr algn="ctr"/>
-            <a:endParaRPr lang="pt-BR"/>
-          </a:p>
-        </p:txBody>
-      </p:sp>
-      <p:sp>
-        <p:nvSpPr>
-          <p:cNvPr id="30" name="Coração 29"/>
-          <p:cNvSpPr>
-            <a:spLocks/>
-          </p:cNvSpPr>
-          <p:nvPr/>
-        </p:nvSpPr>
-        <p:spPr>
-          <a:xfrm>
-            <a:off x="6209375" y="4723080"/>
-            <a:ext cx="262800" cy="262800"/>
-          </a:xfrm>
-          <a:prstGeom prst="heart">
-            <a:avLst/>
-          </a:prstGeom>
-          <a:solidFill>
-            <a:srgbClr val="FF0000"/>
-          </a:solidFill>
-          <a:ln>
-            <a:solidFill>
-              <a:srgbClr val="FF0000"/>
-            </a:solidFill>
-          </a:ln>
-        </p:spPr>
-        <p:style>
-          <a:lnRef idx="2">
-            <a:schemeClr val="accent1">
-              <a:shade val="50000"/>
-            </a:schemeClr>
-          </a:lnRef>
-          <a:fillRef idx="1">
-            <a:schemeClr val="accent1"/>
-          </a:fillRef>
-          <a:effectRef idx="0">
-            <a:schemeClr val="accent1"/>
-          </a:effectRef>
-          <a:fontRef idx="minor">
-            <a:schemeClr val="lt1"/>
-          </a:fontRef>
-        </p:style>
-        <p:txBody>
-          <a:bodyPr rtlCol="0" anchor="ctr"/>
-          <a:lstStyle/>
-          <a:p>
-            <a:pPr algn="ctr"/>
-            <a:endParaRPr lang="pt-BR"/>
-          </a:p>
-        </p:txBody>
-      </p:sp>
-      <p:sp>
-        <p:nvSpPr>
-          <p:cNvPr id="31" name="Coração 30"/>
-          <p:cNvSpPr>
-            <a:spLocks/>
-          </p:cNvSpPr>
-          <p:nvPr/>
-        </p:nvSpPr>
-        <p:spPr>
-          <a:xfrm>
-            <a:off x="6622615" y="4723080"/>
-            <a:ext cx="262800" cy="262800"/>
-          </a:xfrm>
-          <a:prstGeom prst="heart">
-            <a:avLst/>
-          </a:prstGeom>
-          <a:solidFill>
-            <a:srgbClr val="FF0000"/>
-          </a:solidFill>
-          <a:ln>
-            <a:solidFill>
-              <a:srgbClr val="FF0000"/>
-            </a:solidFill>
-          </a:ln>
-        </p:spPr>
-        <p:style>
-          <a:lnRef idx="2">
-            <a:schemeClr val="accent1">
-              <a:shade val="50000"/>
-            </a:schemeClr>
-          </a:lnRef>
-          <a:fillRef idx="1">
-            <a:schemeClr val="accent1"/>
-          </a:fillRef>
-          <a:effectRef idx="0">
-            <a:schemeClr val="accent1"/>
-          </a:effectRef>
-          <a:fontRef idx="minor">
-            <a:schemeClr val="lt1"/>
-          </a:fontRef>
-        </p:style>
-        <p:txBody>
-          <a:bodyPr rtlCol="0" anchor="ctr"/>
-          <a:lstStyle/>
-          <a:p>
-            <a:pPr algn="ctr"/>
-            <a:endParaRPr lang="pt-BR"/>
-          </a:p>
-        </p:txBody>
-      </p:sp>
     </p:spTree>
     <p:extLst>
       <p:ext uri="{BB962C8B-B14F-4D97-AF65-F5344CB8AC3E}">
-        <p14:creationId xmlns:p14="http://schemas.microsoft.com/office/powerpoint/2010/main" val="1902036316"/>
+        <p14:creationId xmlns:p14="http://schemas.microsoft.com/office/powerpoint/2010/main" val="757144499"/>
       </p:ext>
     </p:extLst>
   </p:cSld>
@@ -4776,7 +4373,7 @@
         </p:spPr>
         <p:txBody>
           <a:bodyPr vert="horz" lIns="91440" tIns="45720" rIns="91440" bIns="45720" rtlCol="0" anchor="ctr">
-            <a:normAutofit/>
+            <a:noAutofit/>
           </a:bodyPr>
           <a:lstStyle>
             <a:defPPr>
@@ -4876,17 +4473,77 @@
           <a:p>
             <a:pPr algn="ctr">
               <a:lnSpc>
-                <a:spcPct val="110000"/>
+                <a:spcPct val="125000"/>
               </a:lnSpc>
             </a:pPr>
             <a:r>
-              <a:rPr lang="pt-BR" sz="5000" dirty="0" smtClean="0">
-                <a:solidFill>
-                  <a:schemeClr val="accent2"/>
-                </a:solidFill>
+              <a:rPr lang="pt-BR" sz="3500" dirty="0" smtClean="0">
                 <a:latin typeface="Grinched" panose="02000000000000000000" pitchFamily="2" charset="0"/>
               </a:rPr>
-              <a:t>Programadores</a:t>
+              <a:t>Atinja os </a:t>
+            </a:r>
+            <a:r>
+              <a:rPr lang="pt-BR" sz="5000" b="1" dirty="0" smtClean="0">
+                <a:latin typeface="Grinched" panose="02000000000000000000" pitchFamily="2" charset="0"/>
+              </a:rPr>
+              <a:t>fantasminhas</a:t>
+            </a:r>
+            <a:r>
+              <a:rPr lang="pt-BR" sz="3500" dirty="0" smtClean="0">
+                <a:latin typeface="Grinched" panose="02000000000000000000" pitchFamily="2" charset="0"/>
+              </a:rPr>
+              <a:t>.</a:t>
+            </a:r>
+          </a:p>
+          <a:p>
+            <a:pPr algn="ctr">
+              <a:lnSpc>
+                <a:spcPct val="125000"/>
+              </a:lnSpc>
+            </a:pPr>
+            <a:r>
+              <a:rPr lang="pt-BR" sz="3500" dirty="0" smtClean="0">
+                <a:latin typeface="Grinched" panose="02000000000000000000" pitchFamily="2" charset="0"/>
+              </a:rPr>
+              <a:t>Evite o pac-man!</a:t>
+            </a:r>
+          </a:p>
+          <a:p>
+            <a:pPr algn="ctr">
+              <a:lnSpc>
+                <a:spcPct val="125000"/>
+              </a:lnSpc>
+            </a:pPr>
+            <a:r>
+              <a:rPr lang="pt-BR" sz="3500" dirty="0" smtClean="0">
+                <a:latin typeface="Grinched" panose="02000000000000000000" pitchFamily="2" charset="0"/>
+              </a:rPr>
+              <a:t>Fique de olho no cronometro...	</a:t>
+            </a:r>
+            <a:r>
+              <a:rPr lang="pt-BR" sz="3500" dirty="0" smtClean="0">
+                <a:solidFill>
+                  <a:schemeClr val="bg1">
+                    <a:lumMod val="65000"/>
+                    <a:lumOff val="35000"/>
+                  </a:schemeClr>
+                </a:solidFill>
+                <a:latin typeface="Grinched" panose="02000000000000000000" pitchFamily="2" charset="0"/>
+              </a:rPr>
+              <a:t>00:30</a:t>
+            </a:r>
+          </a:p>
+          <a:p>
+            <a:pPr>
+              <a:lnSpc>
+                <a:spcPct val="125000"/>
+              </a:lnSpc>
+            </a:pPr>
+            <a:r>
+              <a:rPr lang="pt-BR" sz="3500" dirty="0" smtClean="0">
+                <a:latin typeface="Grinched" panose="02000000000000000000" pitchFamily="2" charset="0"/>
+              </a:rPr>
+              <a:t>	       Voce dispoe de 3 vidas.</a:t>
             </a:r>
           </a:p>
           <a:p>
@@ -4895,31 +4552,7 @@
                 <a:spcPct val="110000"/>
               </a:lnSpc>
             </a:pPr>
-            <a:r>
-              <a:rPr lang="pt-BR" sz="3500" dirty="0" smtClean="0">
-                <a:latin typeface="Grinched" panose="02000000000000000000" pitchFamily="2" charset="0"/>
-              </a:rPr>
-              <a:t>Anderson Lima  </a:t>
-            </a:r>
-            <a:r>
-              <a:rPr lang="pt-BR" sz="3500" dirty="0" smtClean="0">
-                <a:latin typeface="Andy" panose="03080602030302030203" pitchFamily="66" charset="0"/>
-              </a:rPr>
-              <a:t>| </a:t>
-            </a:r>
-            <a:r>
-              <a:rPr lang="pt-BR" sz="3500" dirty="0" smtClean="0">
-                <a:latin typeface="Grinched" panose="02000000000000000000" pitchFamily="2" charset="0"/>
-              </a:rPr>
-              <a:t> Carlos </a:t>
-            </a:r>
-            <a:r>
-              <a:rPr lang="pt-BR" sz="3500" dirty="0">
-                <a:latin typeface="Grinched" panose="02000000000000000000" pitchFamily="2" charset="0"/>
-              </a:rPr>
-              <a:t>Filho</a:t>
-            </a:r>
-            <a:endParaRPr lang="pt-BR" sz="3500" dirty="0" smtClean="0">
+            <a:endParaRPr lang="pt-BR" sz="2000" dirty="0" smtClean="0">
               <a:latin typeface="Grinched" panose="02000000000000000000" pitchFamily="2" charset="0"/>
             </a:endParaRPr>
           </a:p>
@@ -4930,65 +4563,14 @@
               </a:lnSpc>
             </a:pPr>
             <a:r>
-              <a:rPr lang="pt-BR" sz="3500" dirty="0" smtClean="0">
+              <a:rPr lang="pt-BR" sz="5000" dirty="0" smtClean="0">
+                <a:solidFill>
+                  <a:schemeClr val="accent2"/>
+                </a:solidFill>
                 <a:latin typeface="Grinched" panose="02000000000000000000" pitchFamily="2" charset="0"/>
               </a:rPr>
-              <a:t>Anne Oliveira  </a:t>
-            </a:r>
-            <a:r>
-              <a:rPr lang="pt-BR" sz="3500" dirty="0" smtClean="0">
-                <a:latin typeface="Andy" panose="03080602030302030203" pitchFamily="66" charset="0"/>
-              </a:rPr>
-              <a:t>|</a:t>
-            </a:r>
-            <a:r>
-              <a:rPr lang="pt-BR" sz="3500" dirty="0" smtClean="0">
-                <a:latin typeface="Grinched" panose="02000000000000000000" pitchFamily="2" charset="0"/>
-              </a:rPr>
-              <a:t>  Juliane Silva  </a:t>
-            </a:r>
-            <a:r>
-              <a:rPr lang="pt-BR" sz="3500" dirty="0">
-                <a:latin typeface="Andy" panose="03080602030302030203" pitchFamily="66" charset="0"/>
-              </a:rPr>
-              <a:t>|</a:t>
-            </a:r>
-            <a:r>
-              <a:rPr lang="pt-BR" sz="3500" dirty="0" smtClean="0">
-                <a:latin typeface="Grinched" panose="02000000000000000000" pitchFamily="2" charset="0"/>
-              </a:rPr>
-              <a:t>  Matheus Palheta</a:t>
-            </a:r>
-          </a:p>
-          <a:p>
-            <a:pPr algn="ctr">
-              <a:lnSpc>
-                <a:spcPct val="110000"/>
-              </a:lnSpc>
-            </a:pPr>
-            <a:endParaRPr lang="pt-BR" sz="3000" dirty="0">
-              <a:latin typeface="Grinched" panose="02000000000000000000" pitchFamily="2" charset="0"/>
-            </a:endParaRPr>
-          </a:p>
-          <a:p>
-            <a:pPr algn="ctr">
-              <a:lnSpc>
-                <a:spcPct val="110000"/>
-              </a:lnSpc>
-            </a:pPr>
-            <a:endParaRPr lang="pt-BR" sz="5000" dirty="0" smtClean="0">
-              <a:latin typeface="Grinched" panose="02000000000000000000" pitchFamily="2" charset="0"/>
-            </a:endParaRPr>
-          </a:p>
-          <a:p>
-            <a:pPr algn="ctr">
-              <a:lnSpc>
-                <a:spcPct val="110000"/>
-              </a:lnSpc>
-            </a:pPr>
-            <a:endParaRPr lang="pt-BR" sz="3500" dirty="0" smtClean="0">
-              <a:latin typeface="Grinched" panose="02000000000000000000" pitchFamily="2" charset="0"/>
-            </a:endParaRPr>
+              <a:t>Divirta-se!</a:t>
+            </a:r>
           </a:p>
         </p:txBody>
       </p:sp>
@@ -5117,7 +4699,7 @@
                 </a:solidFill>
                 <a:latin typeface="Halloween" pitchFamily="2" charset="0"/>
               </a:rPr>
-              <a:t>Créditos</a:t>
+              <a:t>Como Jogar</a:t>
             </a:r>
             <a:endParaRPr lang="pt-BR" sz="7000" dirty="0">
               <a:solidFill>
@@ -5125,6 +4707,43 @@
               </a:solidFill>
               <a:latin typeface="Halloween" pitchFamily="2" charset="0"/>
             </a:endParaRPr>
+          </a:p>
+        </p:txBody>
+      </p:sp>
+      <p:sp>
+        <p:nvSpPr>
+          <p:cNvPr id="11" name="CaixaDeTexto 10"/>
+          <p:cNvSpPr txBox="1"/>
+          <p:nvPr/>
+        </p:nvSpPr>
+        <p:spPr>
+          <a:xfrm rot="19008857">
+            <a:off x="515002" y="614559"/>
+            <a:ext cx="1172188" cy="477054"/>
+          </a:xfrm>
+          <a:prstGeom prst="rect">
+            <a:avLst/>
+          </a:prstGeom>
+          <a:noFill/>
+        </p:spPr>
+        <p:txBody>
+          <a:bodyPr wrap="square" rtlCol="0">
+            <a:spAutoFit/>
+          </a:bodyPr>
+          <a:lstStyle/>
+          <a:p>
+            <a:r>
+              <a:rPr lang="pt-BR" sz="2500" dirty="0" smtClean="0">
+                <a:solidFill>
+                  <a:schemeClr val="bg1">
+                    <a:lumMod val="50000"/>
+                    <a:lumOff val="50000"/>
+                  </a:schemeClr>
+                </a:solidFill>
+                <a:latin typeface="Grinched" panose="02000000000000000000" pitchFamily="2" charset="0"/>
+              </a:rPr>
+              <a:t>NO-BOO</a:t>
+            </a:r>
           </a:p>
         </p:txBody>
       </p:sp>
@@ -5278,160 +4897,220 @@
           </a:prstGeom>
         </p:spPr>
       </p:pic>
-      <p:sp>
-        <p:nvSpPr>
-          <p:cNvPr id="14" name="CaixaDeTexto 13"/>
-          <p:cNvSpPr txBox="1"/>
+      <p:pic>
+        <p:nvPicPr>
+          <p:cNvPr id="2" name="Imagem 1"/>
+          <p:cNvPicPr>
+            <a:picLocks noChangeAspect="1"/>
+          </p:cNvPicPr>
           <p:nvPr/>
-        </p:nvSpPr>
-        <p:spPr>
-          <a:xfrm>
-            <a:off x="1530248" y="4781211"/>
-            <a:ext cx="2535785" cy="1531188"/>
+        </p:nvPicPr>
+        <p:blipFill>
+          <a:blip r:embed="rId7">
+            <a:extLst>
+              <a:ext uri="{28A0092B-C50C-407E-A947-70E740481C1C}">
+                <a14:useLocalDpi xmlns:a14="http://schemas.microsoft.com/office/drawing/2010/main" val="0"/>
+              </a:ext>
+            </a:extLst>
+          </a:blip>
+          <a:stretch>
+            <a:fillRect/>
+          </a:stretch>
+        </p:blipFill>
+        <p:spPr>
+          <a:xfrm rot="10800000">
+            <a:off x="5940152" y="3370640"/>
+            <a:ext cx="314286" cy="304762"/>
           </a:xfrm>
           <a:prstGeom prst="rect">
             <a:avLst/>
           </a:prstGeom>
-          <a:noFill/>
-        </p:spPr>
-        <p:txBody>
-          <a:bodyPr wrap="square" rtlCol="0">
-            <a:spAutoFit/>
-          </a:bodyPr>
-          <a:lstStyle/>
-          <a:p>
-            <a:pPr algn="ctr">
-              <a:lnSpc>
-                <a:spcPct val="110000"/>
-              </a:lnSpc>
-            </a:pPr>
-            <a:r>
-              <a:rPr lang="pt-BR" sz="5000" dirty="0">
-                <a:solidFill>
-                  <a:schemeClr val="accent2"/>
-                </a:solidFill>
-                <a:latin typeface="Grinched" panose="02000000000000000000" pitchFamily="2" charset="0"/>
-              </a:rPr>
-              <a:t>Som</a:t>
-            </a:r>
-          </a:p>
-          <a:p>
-            <a:pPr algn="ctr">
-              <a:lnSpc>
-                <a:spcPct val="110000"/>
-              </a:lnSpc>
-            </a:pPr>
-            <a:r>
-              <a:rPr lang="pt-BR" sz="3500" dirty="0">
-                <a:latin typeface="Grinched" panose="02000000000000000000" pitchFamily="2" charset="0"/>
-              </a:rPr>
-              <a:t>Ray Parker Jr</a:t>
-            </a:r>
-            <a:r>
-              <a:rPr lang="pt-BR" sz="3500" dirty="0" smtClean="0">
-                <a:latin typeface="Grinched" panose="02000000000000000000" pitchFamily="2" charset="0"/>
-              </a:rPr>
-              <a:t>.</a:t>
-            </a:r>
-            <a:endParaRPr lang="pt-BR" sz="3500" dirty="0">
-              <a:latin typeface="Grinched" panose="02000000000000000000" pitchFamily="2" charset="0"/>
-            </a:endParaRPr>
-          </a:p>
-        </p:txBody>
-      </p:sp>
-      <p:sp>
-        <p:nvSpPr>
-          <p:cNvPr id="15" name="CaixaDeTexto 14"/>
-          <p:cNvSpPr txBox="1"/>
+        </p:spPr>
+      </p:pic>
+      <p:pic>
+        <p:nvPicPr>
+          <p:cNvPr id="3" name="Imagem 2"/>
+          <p:cNvPicPr>
+            <a:picLocks noChangeAspect="1"/>
+          </p:cNvPicPr>
           <p:nvPr/>
-        </p:nvSpPr>
-        <p:spPr>
-          <a:xfrm>
-            <a:off x="5077967" y="4781211"/>
-            <a:ext cx="2535785" cy="1531188"/>
+        </p:nvPicPr>
+        <p:blipFill>
+          <a:blip r:embed="rId8">
+            <a:extLst>
+              <a:ext uri="{28A0092B-C50C-407E-A947-70E740481C1C}">
+                <a14:useLocalDpi xmlns:a14="http://schemas.microsoft.com/office/drawing/2010/main" val="0"/>
+              </a:ext>
+            </a:extLst>
+          </a:blip>
+          <a:stretch>
+            <a:fillRect/>
+          </a:stretch>
+        </p:blipFill>
+        <p:spPr>
+          <a:xfrm>
+            <a:off x="2843808" y="3343344"/>
+            <a:ext cx="314286" cy="304762"/>
           </a:xfrm>
           <a:prstGeom prst="rect">
             <a:avLst/>
           </a:prstGeom>
-          <a:noFill/>
-        </p:spPr>
-        <p:txBody>
-          <a:bodyPr wrap="square" rtlCol="0">
-            <a:spAutoFit/>
-          </a:bodyPr>
-          <a:lstStyle/>
-          <a:p>
-            <a:pPr algn="ctr">
-              <a:lnSpc>
-                <a:spcPct val="110000"/>
-              </a:lnSpc>
-            </a:pPr>
-            <a:r>
-              <a:rPr lang="pt-BR" sz="5000" dirty="0">
-                <a:solidFill>
-                  <a:schemeClr val="accent2"/>
-                </a:solidFill>
-                <a:latin typeface="Grinched" panose="02000000000000000000" pitchFamily="2" charset="0"/>
-              </a:rPr>
-              <a:t>Orientador</a:t>
-            </a:r>
-          </a:p>
-          <a:p>
-            <a:pPr algn="ctr">
-              <a:lnSpc>
-                <a:spcPct val="110000"/>
-              </a:lnSpc>
-            </a:pPr>
-            <a:r>
-              <a:rPr lang="pt-BR" sz="3500" dirty="0">
-                <a:latin typeface="Grinched" panose="02000000000000000000" pitchFamily="2" charset="0"/>
-              </a:rPr>
-              <a:t>Jucimar Jr.</a:t>
-            </a:r>
-          </a:p>
-        </p:txBody>
-      </p:sp>
-      <p:sp>
-        <p:nvSpPr>
-          <p:cNvPr id="18" name="CaixaDeTexto 17"/>
-          <p:cNvSpPr txBox="1"/>
+        </p:spPr>
+      </p:pic>
+      <p:sp>
+        <p:nvSpPr>
+          <p:cNvPr id="29" name="Coração 28"/>
+          <p:cNvSpPr>
+            <a:spLocks/>
+          </p:cNvSpPr>
           <p:nvPr/>
         </p:nvSpPr>
         <p:spPr>
-          <a:xfrm rot="19008857">
-            <a:off x="515002" y="614559"/>
-            <a:ext cx="1172188" cy="477054"/>
-          </a:xfrm>
-          <a:prstGeom prst="rect">
+          <a:xfrm>
+            <a:off x="5796136" y="4723080"/>
+            <a:ext cx="262800" cy="262800"/>
+          </a:xfrm>
+          <a:prstGeom prst="heart">
             <a:avLst/>
           </a:prstGeom>
-          <a:noFill/>
-        </p:spPr>
-        <p:txBody>
-          <a:bodyPr wrap="square" rtlCol="0">
-            <a:spAutoFit/>
-          </a:bodyPr>
+          <a:solidFill>
+            <a:srgbClr val="FF0000"/>
+          </a:solidFill>
+          <a:ln>
+            <a:solidFill>
+              <a:srgbClr val="FF0000"/>
+            </a:solidFill>
+          </a:ln>
+        </p:spPr>
+        <p:style>
+          <a:lnRef idx="2">
+            <a:schemeClr val="accent1">
+              <a:shade val="50000"/>
+            </a:schemeClr>
+          </a:lnRef>
+          <a:fillRef idx="1">
+            <a:schemeClr val="accent1"/>
+          </a:fillRef>
+          <a:effectRef idx="0">
+            <a:schemeClr val="accent1"/>
+          </a:effectRef>
+          <a:fontRef idx="minor">
+            <a:schemeClr val="lt1"/>
+          </a:fontRef>
+        </p:style>
+        <p:txBody>
+          <a:bodyPr rtlCol="0" anchor="ctr"/>
           <a:lstStyle/>
           <a:p>
-            <a:r>
-              <a:rPr lang="pt-BR" sz="2500" dirty="0" smtClean="0">
-                <a:solidFill>
-                  <a:schemeClr val="bg1">
-                    <a:lumMod val="50000"/>
-                    <a:lumOff val="50000"/>
-                  </a:schemeClr>
-                </a:solidFill>
-                <a:latin typeface="Grinched" panose="02000000000000000000" pitchFamily="2" charset="0"/>
-              </a:rPr>
-              <a:t>NO-BOO</a:t>
-            </a:r>
+            <a:pPr algn="ctr"/>
+            <a:endParaRPr lang="pt-BR"/>
+          </a:p>
+        </p:txBody>
+      </p:sp>
+      <p:sp>
+        <p:nvSpPr>
+          <p:cNvPr id="30" name="Coração 29"/>
+          <p:cNvSpPr>
+            <a:spLocks/>
+          </p:cNvSpPr>
+          <p:nvPr/>
+        </p:nvSpPr>
+        <p:spPr>
+          <a:xfrm>
+            <a:off x="6209375" y="4723080"/>
+            <a:ext cx="262800" cy="262800"/>
+          </a:xfrm>
+          <a:prstGeom prst="heart">
+            <a:avLst/>
+          </a:prstGeom>
+          <a:solidFill>
+            <a:srgbClr val="FF0000"/>
+          </a:solidFill>
+          <a:ln>
+            <a:solidFill>
+              <a:srgbClr val="FF0000"/>
+            </a:solidFill>
+          </a:ln>
+        </p:spPr>
+        <p:style>
+          <a:lnRef idx="2">
+            <a:schemeClr val="accent1">
+              <a:shade val="50000"/>
+            </a:schemeClr>
+          </a:lnRef>
+          <a:fillRef idx="1">
+            <a:schemeClr val="accent1"/>
+          </a:fillRef>
+          <a:effectRef idx="0">
+            <a:schemeClr val="accent1"/>
+          </a:effectRef>
+          <a:fontRef idx="minor">
+            <a:schemeClr val="lt1"/>
+          </a:fontRef>
+        </p:style>
+        <p:txBody>
+          <a:bodyPr rtlCol="0" anchor="ctr"/>
+          <a:lstStyle/>
+          <a:p>
+            <a:pPr algn="ctr"/>
+            <a:endParaRPr lang="pt-BR"/>
+          </a:p>
+        </p:txBody>
+      </p:sp>
+      <p:sp>
+        <p:nvSpPr>
+          <p:cNvPr id="31" name="Coração 30"/>
+          <p:cNvSpPr>
+            <a:spLocks/>
+          </p:cNvSpPr>
+          <p:nvPr/>
+        </p:nvSpPr>
+        <p:spPr>
+          <a:xfrm>
+            <a:off x="6622615" y="4723080"/>
+            <a:ext cx="262800" cy="262800"/>
+          </a:xfrm>
+          <a:prstGeom prst="heart">
+            <a:avLst/>
+          </a:prstGeom>
+          <a:solidFill>
+            <a:srgbClr val="FF0000"/>
+          </a:solidFill>
+          <a:ln>
+            <a:solidFill>
+              <a:srgbClr val="FF0000"/>
+            </a:solidFill>
+          </a:ln>
+        </p:spPr>
+        <p:style>
+          <a:lnRef idx="2">
+            <a:schemeClr val="accent1">
+              <a:shade val="50000"/>
+            </a:schemeClr>
+          </a:lnRef>
+          <a:fillRef idx="1">
+            <a:schemeClr val="accent1"/>
+          </a:fillRef>
+          <a:effectRef idx="0">
+            <a:schemeClr val="accent1"/>
+          </a:effectRef>
+          <a:fontRef idx="minor">
+            <a:schemeClr val="lt1"/>
+          </a:fontRef>
+        </p:style>
+        <p:txBody>
+          <a:bodyPr rtlCol="0" anchor="ctr"/>
+          <a:lstStyle/>
+          <a:p>
+            <a:pPr algn="ctr"/>
+            <a:endParaRPr lang="pt-BR"/>
           </a:p>
         </p:txBody>
       </p:sp>
     </p:spTree>
     <p:extLst>
       <p:ext uri="{BB962C8B-B14F-4D97-AF65-F5344CB8AC3E}">
-        <p14:creationId xmlns:p14="http://schemas.microsoft.com/office/powerpoint/2010/main" val="1144118276"/>
+        <p14:creationId xmlns:p14="http://schemas.microsoft.com/office/powerpoint/2010/main" val="1902036316"/>
       </p:ext>
     </p:extLst>
   </p:cSld>
@@ -5487,8 +5166,8 @@
         </p:nvSpPr>
         <p:spPr>
           <a:xfrm>
-            <a:off x="457200" y="5187983"/>
-            <a:ext cx="8229600" cy="1143000"/>
+            <a:off x="457200" y="2024092"/>
+            <a:ext cx="8229600" cy="4536503"/>
           </a:xfrm>
           <a:prstGeom prst="rect">
             <a:avLst/>
@@ -5594,14 +5273,119 @@
             </a:lvl9pPr>
           </a:lstStyle>
           <a:p>
-            <a:pPr algn="ctr"/>
-            <a:r>
-              <a:rPr lang="pt-BR" sz="5000" dirty="0">
+            <a:pPr algn="ctr">
+              <a:lnSpc>
+                <a:spcPct val="110000"/>
+              </a:lnSpc>
+            </a:pPr>
+            <a:r>
+              <a:rPr lang="pt-BR" sz="5000" dirty="0" smtClean="0">
+                <a:solidFill>
+                  <a:schemeClr val="accent2"/>
+                </a:solidFill>
                 <a:latin typeface="Grinched" panose="02000000000000000000" pitchFamily="2" charset="0"/>
               </a:rPr>
-              <a:t>Voce atingiu 5 fantasmas.</a:t>
-            </a:r>
-            <a:endParaRPr lang="pt-BR" sz="5000" dirty="0">
+              <a:t>Programadores</a:t>
+            </a:r>
+          </a:p>
+          <a:p>
+            <a:pPr algn="ctr">
+              <a:lnSpc>
+                <a:spcPct val="110000"/>
+              </a:lnSpc>
+            </a:pPr>
+            <a:r>
+              <a:rPr lang="pt-BR" sz="3500" dirty="0" smtClean="0">
+                <a:latin typeface="Grinched" panose="02000000000000000000" pitchFamily="2" charset="0"/>
+              </a:rPr>
+              <a:t>Anderson Lima  </a:t>
+            </a:r>
+            <a:r>
+              <a:rPr lang="pt-BR" sz="3500" dirty="0" smtClean="0">
+                <a:latin typeface="Andy" panose="03080602030302030203" pitchFamily="66" charset="0"/>
+              </a:rPr>
+              <a:t>| </a:t>
+            </a:r>
+            <a:r>
+              <a:rPr lang="pt-BR" sz="3500" dirty="0" smtClean="0">
+                <a:latin typeface="Grinched" panose="02000000000000000000" pitchFamily="2" charset="0"/>
+              </a:rPr>
+              <a:t> Carlos </a:t>
+            </a:r>
+            <a:r>
+              <a:rPr lang="pt-BR" sz="3500" dirty="0">
+                <a:latin typeface="Grinched" panose="02000000000000000000" pitchFamily="2" charset="0"/>
+              </a:rPr>
+              <a:t>Filho</a:t>
+            </a:r>
+            <a:endParaRPr lang="pt-BR" sz="3500" dirty="0" smtClean="0">
+              <a:latin typeface="Grinched" panose="02000000000000000000" pitchFamily="2" charset="0"/>
+            </a:endParaRPr>
+          </a:p>
+          <a:p>
+            <a:pPr algn="ctr">
+              <a:lnSpc>
+                <a:spcPct val="110000"/>
+              </a:lnSpc>
+            </a:pPr>
+            <a:r>
+              <a:rPr lang="pt-BR" sz="3500" dirty="0" smtClean="0">
+                <a:latin typeface="Grinched" panose="02000000000000000000" pitchFamily="2" charset="0"/>
+              </a:rPr>
+              <a:t>Anne Oliveira  </a:t>
+            </a:r>
+            <a:r>
+              <a:rPr lang="pt-BR" sz="3500" dirty="0" smtClean="0">
+                <a:latin typeface="Andy" panose="03080602030302030203" pitchFamily="66" charset="0"/>
+              </a:rPr>
+              <a:t>|</a:t>
+            </a:r>
+            <a:r>
+              <a:rPr lang="pt-BR" sz="3500" dirty="0" smtClean="0">
+                <a:latin typeface="Grinched" panose="02000000000000000000" pitchFamily="2" charset="0"/>
+              </a:rPr>
+              <a:t>  Juliane Silva  </a:t>
+            </a:r>
+            <a:r>
+              <a:rPr lang="pt-BR" sz="3500" dirty="0">
+                <a:latin typeface="Andy" panose="03080602030302030203" pitchFamily="66" charset="0"/>
+              </a:rPr>
+              <a:t>|</a:t>
+            </a:r>
+            <a:r>
+              <a:rPr lang="pt-BR" sz="3500" dirty="0" smtClean="0">
+                <a:latin typeface="Grinched" panose="02000000000000000000" pitchFamily="2" charset="0"/>
+              </a:rPr>
+              <a:t>  Matheus Palheta</a:t>
+            </a:r>
+          </a:p>
+          <a:p>
+            <a:pPr algn="ctr">
+              <a:lnSpc>
+                <a:spcPct val="110000"/>
+              </a:lnSpc>
+            </a:pPr>
+            <a:endParaRPr lang="pt-BR" sz="3000" dirty="0">
+              <a:latin typeface="Grinched" panose="02000000000000000000" pitchFamily="2" charset="0"/>
+            </a:endParaRPr>
+          </a:p>
+          <a:p>
+            <a:pPr algn="ctr">
+              <a:lnSpc>
+                <a:spcPct val="110000"/>
+              </a:lnSpc>
+            </a:pPr>
+            <a:endParaRPr lang="pt-BR" sz="5000" dirty="0" smtClean="0">
+              <a:latin typeface="Grinched" panose="02000000000000000000" pitchFamily="2" charset="0"/>
+            </a:endParaRPr>
+          </a:p>
+          <a:p>
+            <a:pPr algn="ctr">
+              <a:lnSpc>
+                <a:spcPct val="110000"/>
+              </a:lnSpc>
+            </a:pPr>
+            <a:endParaRPr lang="pt-BR" sz="3500" dirty="0" smtClean="0">
               <a:latin typeface="Grinched" panose="02000000000000000000" pitchFamily="2" charset="0"/>
             </a:endParaRPr>
           </a:p>
@@ -5617,8 +5401,493 @@
         </p:nvSpPr>
         <p:spPr>
           <a:xfrm>
-            <a:off x="457200" y="319008"/>
-            <a:ext cx="8229600" cy="1582311"/>
+            <a:off x="457200" y="404664"/>
+            <a:ext cx="8229600" cy="1078255"/>
+          </a:xfrm>
+          <a:prstGeom prst="rect">
+            <a:avLst/>
+          </a:prstGeom>
+        </p:spPr>
+        <p:txBody>
+          <a:bodyPr vert="horz" lIns="91440" tIns="45720" rIns="91440" bIns="45720" rtlCol="0" anchor="ctr">
+            <a:normAutofit lnSpcReduction="10000"/>
+          </a:bodyPr>
+          <a:lstStyle>
+            <a:defPPr>
+              <a:defRPr lang="pt-BR"/>
+            </a:defPPr>
+            <a:lvl1pPr marL="0" algn="l" defTabSz="914400" rtl="0" eaLnBrk="1" latinLnBrk="0" hangingPunct="1">
+              <a:defRPr sz="1800" kern="1200">
+                <a:solidFill>
+                  <a:schemeClr val="tx1"/>
+                </a:solidFill>
+                <a:latin typeface="+mn-lt"/>
+                <a:ea typeface="+mn-ea"/>
+                <a:cs typeface="+mn-cs"/>
+              </a:defRPr>
+            </a:lvl1pPr>
+            <a:lvl2pPr marL="457200" algn="l" defTabSz="914400" rtl="0" eaLnBrk="1" latinLnBrk="0" hangingPunct="1">
+              <a:defRPr sz="1800" kern="1200">
+                <a:solidFill>
+                  <a:schemeClr val="tx1"/>
+                </a:solidFill>
+                <a:latin typeface="+mn-lt"/>
+                <a:ea typeface="+mn-ea"/>
+                <a:cs typeface="+mn-cs"/>
+              </a:defRPr>
+            </a:lvl2pPr>
+            <a:lvl3pPr marL="914400" algn="l" defTabSz="914400" rtl="0" eaLnBrk="1" latinLnBrk="0" hangingPunct="1">
+              <a:defRPr sz="1800" kern="1200">
+                <a:solidFill>
+                  <a:schemeClr val="tx1"/>
+                </a:solidFill>
+                <a:latin typeface="+mn-lt"/>
+                <a:ea typeface="+mn-ea"/>
+                <a:cs typeface="+mn-cs"/>
+              </a:defRPr>
+            </a:lvl3pPr>
+            <a:lvl4pPr marL="1371600" algn="l" defTabSz="914400" rtl="0" eaLnBrk="1" latinLnBrk="0" hangingPunct="1">
+              <a:defRPr sz="1800" kern="1200">
+                <a:solidFill>
+                  <a:schemeClr val="tx1"/>
+                </a:solidFill>
+                <a:latin typeface="+mn-lt"/>
+                <a:ea typeface="+mn-ea"/>
+                <a:cs typeface="+mn-cs"/>
+              </a:defRPr>
+            </a:lvl4pPr>
+            <a:lvl5pPr marL="1828800" algn="l" defTabSz="914400" rtl="0" eaLnBrk="1" latinLnBrk="0" hangingPunct="1">
+              <a:defRPr sz="1800" kern="1200">
+                <a:solidFill>
+                  <a:schemeClr val="tx1"/>
+                </a:solidFill>
+                <a:latin typeface="+mn-lt"/>
+                <a:ea typeface="+mn-ea"/>
+                <a:cs typeface="+mn-cs"/>
+              </a:defRPr>
+            </a:lvl5pPr>
+            <a:lvl6pPr marL="2286000" algn="l" defTabSz="914400" rtl="0" eaLnBrk="1" latinLnBrk="0" hangingPunct="1">
+              <a:defRPr sz="1800" kern="1200">
+                <a:solidFill>
+                  <a:schemeClr val="tx1"/>
+                </a:solidFill>
+                <a:latin typeface="+mn-lt"/>
+                <a:ea typeface="+mn-ea"/>
+                <a:cs typeface="+mn-cs"/>
+              </a:defRPr>
+            </a:lvl6pPr>
+            <a:lvl7pPr marL="2743200" algn="l" defTabSz="914400" rtl="0" eaLnBrk="1" latinLnBrk="0" hangingPunct="1">
+              <a:defRPr sz="1800" kern="1200">
+                <a:solidFill>
+                  <a:schemeClr val="tx1"/>
+                </a:solidFill>
+                <a:latin typeface="+mn-lt"/>
+                <a:ea typeface="+mn-ea"/>
+                <a:cs typeface="+mn-cs"/>
+              </a:defRPr>
+            </a:lvl7pPr>
+            <a:lvl8pPr marL="3200400" algn="l" defTabSz="914400" rtl="0" eaLnBrk="1" latinLnBrk="0" hangingPunct="1">
+              <a:defRPr sz="1800" kern="1200">
+                <a:solidFill>
+                  <a:schemeClr val="tx1"/>
+                </a:solidFill>
+                <a:latin typeface="+mn-lt"/>
+                <a:ea typeface="+mn-ea"/>
+                <a:cs typeface="+mn-cs"/>
+              </a:defRPr>
+            </a:lvl8pPr>
+            <a:lvl9pPr marL="3657600" algn="l" defTabSz="914400" rtl="0" eaLnBrk="1" latinLnBrk="0" hangingPunct="1">
+              <a:defRPr sz="1800" kern="1200">
+                <a:solidFill>
+                  <a:schemeClr val="tx1"/>
+                </a:solidFill>
+                <a:latin typeface="+mn-lt"/>
+                <a:ea typeface="+mn-ea"/>
+                <a:cs typeface="+mn-cs"/>
+              </a:defRPr>
+            </a:lvl9pPr>
+          </a:lstStyle>
+          <a:p>
+            <a:pPr algn="ctr"/>
+            <a:r>
+              <a:rPr lang="pt-BR" sz="7000" dirty="0" smtClean="0">
+                <a:solidFill>
+                  <a:schemeClr val="accent1"/>
+                </a:solidFill>
+                <a:latin typeface="Halloween" pitchFamily="2" charset="0"/>
+              </a:rPr>
+              <a:t>Créditos</a:t>
+            </a:r>
+            <a:endParaRPr lang="pt-BR" sz="7000" dirty="0">
+              <a:solidFill>
+                <a:schemeClr val="accent1"/>
+              </a:solidFill>
+              <a:latin typeface="Halloween" pitchFamily="2" charset="0"/>
+            </a:endParaRPr>
+          </a:p>
+        </p:txBody>
+      </p:sp>
+      <p:pic>
+        <p:nvPicPr>
+          <p:cNvPr id="8" name="Imagem 7"/>
+          <p:cNvPicPr>
+            <a:picLocks noChangeAspect="1"/>
+          </p:cNvPicPr>
+          <p:nvPr/>
+        </p:nvPicPr>
+        <p:blipFill>
+          <a:blip r:embed="rId2">
+            <a:extLst>
+              <a:ext uri="{28A0092B-C50C-407E-A947-70E740481C1C}">
+                <a14:useLocalDpi xmlns:a14="http://schemas.microsoft.com/office/drawing/2010/main" val="0"/>
+              </a:ext>
+            </a:extLst>
+          </a:blip>
+          <a:stretch>
+            <a:fillRect/>
+          </a:stretch>
+        </p:blipFill>
+        <p:spPr>
+          <a:xfrm>
+            <a:off x="3840241" y="1443840"/>
+            <a:ext cx="325148" cy="325148"/>
+          </a:xfrm>
+          <a:prstGeom prst="rect">
+            <a:avLst/>
+          </a:prstGeom>
+        </p:spPr>
+      </p:pic>
+      <p:pic>
+        <p:nvPicPr>
+          <p:cNvPr id="9" name="Imagem 8"/>
+          <p:cNvPicPr>
+            <a:picLocks noChangeAspect="1"/>
+          </p:cNvPicPr>
+          <p:nvPr/>
+        </p:nvPicPr>
+        <p:blipFill>
+          <a:blip r:embed="rId3">
+            <a:extLst>
+              <a:ext uri="{28A0092B-C50C-407E-A947-70E740481C1C}">
+                <a14:useLocalDpi xmlns:a14="http://schemas.microsoft.com/office/drawing/2010/main" val="0"/>
+              </a:ext>
+            </a:extLst>
+          </a:blip>
+          <a:stretch>
+            <a:fillRect/>
+          </a:stretch>
+        </p:blipFill>
+        <p:spPr>
+          <a:xfrm>
+            <a:off x="5531174" y="1443840"/>
+            <a:ext cx="325148" cy="325148"/>
+          </a:xfrm>
+          <a:prstGeom prst="rect">
+            <a:avLst/>
+          </a:prstGeom>
+        </p:spPr>
+      </p:pic>
+      <p:pic>
+        <p:nvPicPr>
+          <p:cNvPr id="10" name="Imagem 9"/>
+          <p:cNvPicPr>
+            <a:picLocks noChangeAspect="1"/>
+          </p:cNvPicPr>
+          <p:nvPr/>
+        </p:nvPicPr>
+        <p:blipFill>
+          <a:blip r:embed="rId4">
+            <a:extLst>
+              <a:ext uri="{28A0092B-C50C-407E-A947-70E740481C1C}">
+                <a14:useLocalDpi xmlns:a14="http://schemas.microsoft.com/office/drawing/2010/main" val="0"/>
+              </a:ext>
+            </a:extLst>
+          </a:blip>
+          <a:stretch>
+            <a:fillRect/>
+          </a:stretch>
+        </p:blipFill>
+        <p:spPr>
+          <a:xfrm>
+            <a:off x="4417476" y="1454033"/>
+            <a:ext cx="304762" cy="304762"/>
+          </a:xfrm>
+          <a:prstGeom prst="rect">
+            <a:avLst/>
+          </a:prstGeom>
+        </p:spPr>
+      </p:pic>
+      <p:pic>
+        <p:nvPicPr>
+          <p:cNvPr id="12" name="Imagem 11"/>
+          <p:cNvPicPr>
+            <a:picLocks noChangeAspect="1"/>
+          </p:cNvPicPr>
+          <p:nvPr/>
+        </p:nvPicPr>
+        <p:blipFill>
+          <a:blip r:embed="rId5">
+            <a:extLst>
+              <a:ext uri="{28A0092B-C50C-407E-A947-70E740481C1C}">
+                <a14:useLocalDpi xmlns:a14="http://schemas.microsoft.com/office/drawing/2010/main" val="0"/>
+              </a:ext>
+            </a:extLst>
+          </a:blip>
+          <a:stretch>
+            <a:fillRect/>
+          </a:stretch>
+        </p:blipFill>
+        <p:spPr>
+          <a:xfrm>
+            <a:off x="4974325" y="1454033"/>
+            <a:ext cx="304762" cy="304762"/>
+          </a:xfrm>
+          <a:prstGeom prst="rect">
+            <a:avLst/>
+          </a:prstGeom>
+        </p:spPr>
+      </p:pic>
+      <p:pic>
+        <p:nvPicPr>
+          <p:cNvPr id="13" name="Imagem 12"/>
+          <p:cNvPicPr>
+            <a:picLocks noChangeAspect="1"/>
+          </p:cNvPicPr>
+          <p:nvPr/>
+        </p:nvPicPr>
+        <p:blipFill>
+          <a:blip r:embed="rId6">
+            <a:extLst>
+              <a:ext uri="{28A0092B-C50C-407E-A947-70E740481C1C}">
+                <a14:useLocalDpi xmlns:a14="http://schemas.microsoft.com/office/drawing/2010/main" val="0"/>
+              </a:ext>
+            </a:extLst>
+          </a:blip>
+          <a:stretch>
+            <a:fillRect/>
+          </a:stretch>
+        </p:blipFill>
+        <p:spPr>
+          <a:xfrm>
+            <a:off x="3283392" y="1454033"/>
+            <a:ext cx="304762" cy="304762"/>
+          </a:xfrm>
+          <a:prstGeom prst="rect">
+            <a:avLst/>
+          </a:prstGeom>
+        </p:spPr>
+      </p:pic>
+      <p:sp>
+        <p:nvSpPr>
+          <p:cNvPr id="14" name="CaixaDeTexto 13"/>
+          <p:cNvSpPr txBox="1"/>
+          <p:nvPr/>
+        </p:nvSpPr>
+        <p:spPr>
+          <a:xfrm>
+            <a:off x="1530248" y="4781211"/>
+            <a:ext cx="2535785" cy="1531188"/>
+          </a:xfrm>
+          <a:prstGeom prst="rect">
+            <a:avLst/>
+          </a:prstGeom>
+          <a:noFill/>
+        </p:spPr>
+        <p:txBody>
+          <a:bodyPr wrap="square" rtlCol="0">
+            <a:spAutoFit/>
+          </a:bodyPr>
+          <a:lstStyle/>
+          <a:p>
+            <a:pPr algn="ctr">
+              <a:lnSpc>
+                <a:spcPct val="110000"/>
+              </a:lnSpc>
+            </a:pPr>
+            <a:r>
+              <a:rPr lang="pt-BR" sz="5000" dirty="0">
+                <a:solidFill>
+                  <a:schemeClr val="accent2"/>
+                </a:solidFill>
+                <a:latin typeface="Grinched" panose="02000000000000000000" pitchFamily="2" charset="0"/>
+              </a:rPr>
+              <a:t>Som</a:t>
+            </a:r>
+          </a:p>
+          <a:p>
+            <a:pPr algn="ctr">
+              <a:lnSpc>
+                <a:spcPct val="110000"/>
+              </a:lnSpc>
+            </a:pPr>
+            <a:r>
+              <a:rPr lang="pt-BR" sz="3500" dirty="0">
+                <a:latin typeface="Grinched" panose="02000000000000000000" pitchFamily="2" charset="0"/>
+              </a:rPr>
+              <a:t>Ray Parker Jr</a:t>
+            </a:r>
+            <a:r>
+              <a:rPr lang="pt-BR" sz="3500" dirty="0" smtClean="0">
+                <a:latin typeface="Grinched" panose="02000000000000000000" pitchFamily="2" charset="0"/>
+              </a:rPr>
+              <a:t>.</a:t>
+            </a:r>
+            <a:endParaRPr lang="pt-BR" sz="3500" dirty="0">
+              <a:latin typeface="Grinched" panose="02000000000000000000" pitchFamily="2" charset="0"/>
+            </a:endParaRPr>
+          </a:p>
+        </p:txBody>
+      </p:sp>
+      <p:sp>
+        <p:nvSpPr>
+          <p:cNvPr id="15" name="CaixaDeTexto 14"/>
+          <p:cNvSpPr txBox="1"/>
+          <p:nvPr/>
+        </p:nvSpPr>
+        <p:spPr>
+          <a:xfrm>
+            <a:off x="5077967" y="4781211"/>
+            <a:ext cx="2535785" cy="1531188"/>
+          </a:xfrm>
+          <a:prstGeom prst="rect">
+            <a:avLst/>
+          </a:prstGeom>
+          <a:noFill/>
+        </p:spPr>
+        <p:txBody>
+          <a:bodyPr wrap="square" rtlCol="0">
+            <a:spAutoFit/>
+          </a:bodyPr>
+          <a:lstStyle/>
+          <a:p>
+            <a:pPr algn="ctr">
+              <a:lnSpc>
+                <a:spcPct val="110000"/>
+              </a:lnSpc>
+            </a:pPr>
+            <a:r>
+              <a:rPr lang="pt-BR" sz="5000" dirty="0">
+                <a:solidFill>
+                  <a:schemeClr val="accent2"/>
+                </a:solidFill>
+                <a:latin typeface="Grinched" panose="02000000000000000000" pitchFamily="2" charset="0"/>
+              </a:rPr>
+              <a:t>Orientador</a:t>
+            </a:r>
+          </a:p>
+          <a:p>
+            <a:pPr algn="ctr">
+              <a:lnSpc>
+                <a:spcPct val="110000"/>
+              </a:lnSpc>
+            </a:pPr>
+            <a:r>
+              <a:rPr lang="pt-BR" sz="3500" dirty="0">
+                <a:latin typeface="Grinched" panose="02000000000000000000" pitchFamily="2" charset="0"/>
+              </a:rPr>
+              <a:t>Jucimar Jr.</a:t>
+            </a:r>
+          </a:p>
+        </p:txBody>
+      </p:sp>
+      <p:sp>
+        <p:nvSpPr>
+          <p:cNvPr id="18" name="CaixaDeTexto 17"/>
+          <p:cNvSpPr txBox="1"/>
+          <p:nvPr/>
+        </p:nvSpPr>
+        <p:spPr>
+          <a:xfrm rot="19008857">
+            <a:off x="515002" y="614559"/>
+            <a:ext cx="1172188" cy="477054"/>
+          </a:xfrm>
+          <a:prstGeom prst="rect">
+            <a:avLst/>
+          </a:prstGeom>
+          <a:noFill/>
+        </p:spPr>
+        <p:txBody>
+          <a:bodyPr wrap="square" rtlCol="0">
+            <a:spAutoFit/>
+          </a:bodyPr>
+          <a:lstStyle/>
+          <a:p>
+            <a:r>
+              <a:rPr lang="pt-BR" sz="2500" dirty="0" smtClean="0">
+                <a:solidFill>
+                  <a:schemeClr val="bg1">
+                    <a:lumMod val="50000"/>
+                    <a:lumOff val="50000"/>
+                  </a:schemeClr>
+                </a:solidFill>
+                <a:latin typeface="Grinched" panose="02000000000000000000" pitchFamily="2" charset="0"/>
+              </a:rPr>
+              <a:t>NO-BOO</a:t>
+            </a:r>
+          </a:p>
+        </p:txBody>
+      </p:sp>
+    </p:spTree>
+    <p:extLst>
+      <p:ext uri="{BB962C8B-B14F-4D97-AF65-F5344CB8AC3E}">
+        <p14:creationId xmlns:p14="http://schemas.microsoft.com/office/powerpoint/2010/main" val="1144118276"/>
+      </p:ext>
+    </p:extLst>
+  </p:cSld>
+  <p:clrMapOvr>
+    <a:masterClrMapping/>
+  </p:clrMapOvr>
+  <mc:AlternateContent xmlns:mc="http://schemas.openxmlformats.org/markup-compatibility/2006" xmlns:p14="http://schemas.microsoft.com/office/powerpoint/2010/main">
+    <mc:Choice Requires="p14">
+      <p:transition spd="med" p14:dur="700">
+        <p:fade/>
+      </p:transition>
+    </mc:Choice>
+    <mc:Fallback xmlns="">
+      <p:transition spd="med">
+        <p:fade/>
+      </p:transition>
+    </mc:Fallback>
+  </mc:AlternateContent>
+  <p:timing>
+    <p:tnLst>
+      <p:par>
+        <p:cTn id="1" dur="indefinite" restart="never" nodeType="tmRoot"/>
+      </p:par>
+    </p:tnLst>
+  </p:timing>
+</p:sld>
+</file>
+
+<file path=ppt/slides/slide6.xml><?xml version="1.0" encoding="utf-8"?>
+<p:sld xmlns:a="http://schemas.openxmlformats.org/drawingml/2006/main" xmlns:r="http://schemas.openxmlformats.org/officeDocument/2006/relationships" xmlns:p="http://schemas.openxmlformats.org/presentationml/2006/main">
+  <p:cSld>
+    <p:spTree>
+      <p:nvGrpSpPr>
+        <p:cNvPr id="1" name=""/>
+        <p:cNvGrpSpPr/>
+        <p:nvPr/>
+      </p:nvGrpSpPr>
+      <p:grpSpPr>
+        <a:xfrm>
+          <a:off x="0" y="0"/>
+          <a:ext cx="0" cy="0"/>
+          <a:chOff x="0" y="0"/>
+          <a:chExt cx="0" cy="0"/>
+        </a:xfrm>
+      </p:grpSpPr>
+      <p:sp>
+        <p:nvSpPr>
+          <p:cNvPr id="6" name="Título 5"/>
+          <p:cNvSpPr txBox="1">
+            <a:spLocks/>
+          </p:cNvSpPr>
+          <p:nvPr/>
+        </p:nvSpPr>
+        <p:spPr>
+          <a:xfrm>
+            <a:off x="457200" y="5187983"/>
+            <a:ext cx="8229600" cy="1143000"/>
           </a:xfrm>
           <a:prstGeom prst="rect">
             <a:avLst/>
@@ -5726,6 +5995,133 @@
           <a:p>
             <a:pPr algn="ctr"/>
             <a:r>
+              <a:rPr lang="pt-BR" sz="5000" dirty="0">
+                <a:latin typeface="Grinched" panose="02000000000000000000" pitchFamily="2" charset="0"/>
+              </a:rPr>
+              <a:t>Voce atingiu 5 fantasmas.</a:t>
+            </a:r>
+          </a:p>
+        </p:txBody>
+      </p:sp>
+      <p:sp>
+        <p:nvSpPr>
+          <p:cNvPr id="7" name="Título 5"/>
+          <p:cNvSpPr txBox="1">
+            <a:spLocks/>
+          </p:cNvSpPr>
+          <p:nvPr/>
+        </p:nvSpPr>
+        <p:spPr>
+          <a:xfrm>
+            <a:off x="457200" y="319008"/>
+            <a:ext cx="8229600" cy="1582311"/>
+          </a:xfrm>
+          <a:prstGeom prst="rect">
+            <a:avLst/>
+          </a:prstGeom>
+        </p:spPr>
+        <p:txBody>
+          <a:bodyPr vert="horz" lIns="91440" tIns="45720" rIns="91440" bIns="45720" rtlCol="0" anchor="ctr">
+            <a:normAutofit/>
+          </a:bodyPr>
+          <a:lstStyle>
+            <a:defPPr>
+              <a:defRPr lang="pt-BR"/>
+            </a:defPPr>
+            <a:lvl1pPr marL="0" algn="l" defTabSz="914400" rtl="0" eaLnBrk="1" latinLnBrk="0" hangingPunct="1">
+              <a:defRPr sz="1800" kern="1200">
+                <a:solidFill>
+                  <a:schemeClr val="tx1"/>
+                </a:solidFill>
+                <a:latin typeface="+mn-lt"/>
+                <a:ea typeface="+mn-ea"/>
+                <a:cs typeface="+mn-cs"/>
+              </a:defRPr>
+            </a:lvl1pPr>
+            <a:lvl2pPr marL="457200" algn="l" defTabSz="914400" rtl="0" eaLnBrk="1" latinLnBrk="0" hangingPunct="1">
+              <a:defRPr sz="1800" kern="1200">
+                <a:solidFill>
+                  <a:schemeClr val="tx1"/>
+                </a:solidFill>
+                <a:latin typeface="+mn-lt"/>
+                <a:ea typeface="+mn-ea"/>
+                <a:cs typeface="+mn-cs"/>
+              </a:defRPr>
+            </a:lvl2pPr>
+            <a:lvl3pPr marL="914400" algn="l" defTabSz="914400" rtl="0" eaLnBrk="1" latinLnBrk="0" hangingPunct="1">
+              <a:defRPr sz="1800" kern="1200">
+                <a:solidFill>
+                  <a:schemeClr val="tx1"/>
+                </a:solidFill>
+                <a:latin typeface="+mn-lt"/>
+                <a:ea typeface="+mn-ea"/>
+                <a:cs typeface="+mn-cs"/>
+              </a:defRPr>
+            </a:lvl3pPr>
+            <a:lvl4pPr marL="1371600" algn="l" defTabSz="914400" rtl="0" eaLnBrk="1" latinLnBrk="0" hangingPunct="1">
+              <a:defRPr sz="1800" kern="1200">
+                <a:solidFill>
+                  <a:schemeClr val="tx1"/>
+                </a:solidFill>
+                <a:latin typeface="+mn-lt"/>
+                <a:ea typeface="+mn-ea"/>
+                <a:cs typeface="+mn-cs"/>
+              </a:defRPr>
+            </a:lvl4pPr>
+            <a:lvl5pPr marL="1828800" algn="l" defTabSz="914400" rtl="0" eaLnBrk="1" latinLnBrk="0" hangingPunct="1">
+              <a:defRPr sz="1800" kern="1200">
+                <a:solidFill>
+                  <a:schemeClr val="tx1"/>
+                </a:solidFill>
+                <a:latin typeface="+mn-lt"/>
+                <a:ea typeface="+mn-ea"/>
+                <a:cs typeface="+mn-cs"/>
+              </a:defRPr>
+            </a:lvl5pPr>
+            <a:lvl6pPr marL="2286000" algn="l" defTabSz="914400" rtl="0" eaLnBrk="1" latinLnBrk="0" hangingPunct="1">
+              <a:defRPr sz="1800" kern="1200">
+                <a:solidFill>
+                  <a:schemeClr val="tx1"/>
+                </a:solidFill>
+                <a:latin typeface="+mn-lt"/>
+                <a:ea typeface="+mn-ea"/>
+                <a:cs typeface="+mn-cs"/>
+              </a:defRPr>
+            </a:lvl6pPr>
+            <a:lvl7pPr marL="2743200" algn="l" defTabSz="914400" rtl="0" eaLnBrk="1" latinLnBrk="0" hangingPunct="1">
+              <a:defRPr sz="1800" kern="1200">
+                <a:solidFill>
+                  <a:schemeClr val="tx1"/>
+                </a:solidFill>
+                <a:latin typeface="+mn-lt"/>
+                <a:ea typeface="+mn-ea"/>
+                <a:cs typeface="+mn-cs"/>
+              </a:defRPr>
+            </a:lvl7pPr>
+            <a:lvl8pPr marL="3200400" algn="l" defTabSz="914400" rtl="0" eaLnBrk="1" latinLnBrk="0" hangingPunct="1">
+              <a:defRPr sz="1800" kern="1200">
+                <a:solidFill>
+                  <a:schemeClr val="tx1"/>
+                </a:solidFill>
+                <a:latin typeface="+mn-lt"/>
+                <a:ea typeface="+mn-ea"/>
+                <a:cs typeface="+mn-cs"/>
+              </a:defRPr>
+            </a:lvl8pPr>
+            <a:lvl9pPr marL="3657600" algn="l" defTabSz="914400" rtl="0" eaLnBrk="1" latinLnBrk="0" hangingPunct="1">
+              <a:defRPr sz="1800" kern="1200">
+                <a:solidFill>
+                  <a:schemeClr val="tx1"/>
+                </a:solidFill>
+                <a:latin typeface="+mn-lt"/>
+                <a:ea typeface="+mn-ea"/>
+                <a:cs typeface="+mn-cs"/>
+              </a:defRPr>
+            </a:lvl9pPr>
+          </a:lstStyle>
+          <a:p>
+            <a:pPr algn="ctr"/>
+            <a:r>
               <a:rPr lang="pt-BR" sz="9000" dirty="0">
                 <a:solidFill>
                   <a:schemeClr val="accent1"/>
@@ -5734,12 +6130,6 @@
               </a:rPr>
               <a:t>PARABÉNS!</a:t>
             </a:r>
-            <a:endParaRPr lang="pt-BR" sz="9000" dirty="0">
-              <a:solidFill>
-                <a:schemeClr val="accent1"/>
-              </a:solidFill>
-              <a:latin typeface="Halloween" pitchFamily="2" charset="0"/>
-            </a:endParaRPr>
           </a:p>
         </p:txBody>
       </p:sp>
@@ -6164,7 +6554,7 @@
 </p:sld>
 </file>
 
-<file path=ppt/slides/slide6.xml><?xml version="1.0" encoding="utf-8"?>
+<file path=ppt/slides/slide7.xml><?xml version="1.0" encoding="utf-8"?>
 <p:sld xmlns:a="http://schemas.openxmlformats.org/drawingml/2006/main" xmlns:r="http://schemas.openxmlformats.org/officeDocument/2006/relationships" xmlns:p="http://schemas.openxmlformats.org/presentationml/2006/main">
   <p:cSld>
     <p:spTree>

</xml_diff>